<commit_message>
[Starting page] editorial changes in Anuket-structure.png
Signed-off-by: Edit Koselak <edit.koselak@nokia.com>
Change-Id: Ic25929824187c7826aab9588e34d7390e9615dcd
</commit_message>
<xml_diff>
--- a/docs/images/Anuket-structure.pptx
+++ b/docs/images/Anuket-structure.pptx
@@ -106,7 +106,18 @@
   </p:defaultTextStyle>
   <p:extLst>
     <p:ext uri="{EFAFB233-063F-42B5-8137-9DF3F51BA10A}">
-      <p15:sldGuideLst xmlns:p15="http://schemas.microsoft.com/office/powerpoint/2012/main"/>
+      <p15:sldGuideLst xmlns:p15="http://schemas.microsoft.com/office/powerpoint/2012/main">
+        <p15:guide id="1" orient="horz" pos="2160" userDrawn="1">
+          <p15:clr>
+            <a:srgbClr val="A4A3A4"/>
+          </p15:clr>
+        </p15:guide>
+        <p15:guide id="2" pos="3840" userDrawn="1">
+          <p15:clr>
+            <a:srgbClr val="A4A3A4"/>
+          </p15:clr>
+        </p15:guide>
+      </p15:sldGuideLst>
     </p:ext>
   </p:extLst>
 </p:presentation>
@@ -442,7 +453,7 @@
           <a:p>
             <a:fld id="{3C1D8A52-78B7-4530-9FD6-785DEB7F4B66}" type="datetimeFigureOut">
               <a:rPr lang="LID4096" smtClean="0"/>
-              <a:t>11/23/2022</a:t>
+              <a:t>01/26/2023</a:t>
             </a:fld>
             <a:endParaRPr lang="LID4096"/>
           </a:p>
@@ -642,7 +653,7 @@
           <a:p>
             <a:fld id="{3C1D8A52-78B7-4530-9FD6-785DEB7F4B66}" type="datetimeFigureOut">
               <a:rPr lang="LID4096" smtClean="0"/>
-              <a:t>11/23/2022</a:t>
+              <a:t>01/26/2023</a:t>
             </a:fld>
             <a:endParaRPr lang="LID4096"/>
           </a:p>
@@ -852,7 +863,7 @@
           <a:p>
             <a:fld id="{3C1D8A52-78B7-4530-9FD6-785DEB7F4B66}" type="datetimeFigureOut">
               <a:rPr lang="LID4096" smtClean="0"/>
-              <a:t>11/23/2022</a:t>
+              <a:t>01/26/2023</a:t>
             </a:fld>
             <a:endParaRPr lang="LID4096"/>
           </a:p>
@@ -1052,7 +1063,7 @@
           <a:p>
             <a:fld id="{3C1D8A52-78B7-4530-9FD6-785DEB7F4B66}" type="datetimeFigureOut">
               <a:rPr lang="LID4096" smtClean="0"/>
-              <a:t>11/23/2022</a:t>
+              <a:t>01/26/2023</a:t>
             </a:fld>
             <a:endParaRPr lang="LID4096"/>
           </a:p>
@@ -1328,7 +1339,7 @@
           <a:p>
             <a:fld id="{3C1D8A52-78B7-4530-9FD6-785DEB7F4B66}" type="datetimeFigureOut">
               <a:rPr lang="LID4096" smtClean="0"/>
-              <a:t>11/23/2022</a:t>
+              <a:t>01/26/2023</a:t>
             </a:fld>
             <a:endParaRPr lang="LID4096"/>
           </a:p>
@@ -1596,7 +1607,7 @@
           <a:p>
             <a:fld id="{3C1D8A52-78B7-4530-9FD6-785DEB7F4B66}" type="datetimeFigureOut">
               <a:rPr lang="LID4096" smtClean="0"/>
-              <a:t>11/23/2022</a:t>
+              <a:t>01/26/2023</a:t>
             </a:fld>
             <a:endParaRPr lang="LID4096"/>
           </a:p>
@@ -2011,7 +2022,7 @@
           <a:p>
             <a:fld id="{3C1D8A52-78B7-4530-9FD6-785DEB7F4B66}" type="datetimeFigureOut">
               <a:rPr lang="LID4096" smtClean="0"/>
-              <a:t>11/23/2022</a:t>
+              <a:t>01/26/2023</a:t>
             </a:fld>
             <a:endParaRPr lang="LID4096"/>
           </a:p>
@@ -2153,7 +2164,7 @@
           <a:p>
             <a:fld id="{3C1D8A52-78B7-4530-9FD6-785DEB7F4B66}" type="datetimeFigureOut">
               <a:rPr lang="LID4096" smtClean="0"/>
-              <a:t>11/23/2022</a:t>
+              <a:t>01/26/2023</a:t>
             </a:fld>
             <a:endParaRPr lang="LID4096"/>
           </a:p>
@@ -2266,7 +2277,7 @@
           <a:p>
             <a:fld id="{3C1D8A52-78B7-4530-9FD6-785DEB7F4B66}" type="datetimeFigureOut">
               <a:rPr lang="LID4096" smtClean="0"/>
-              <a:t>11/23/2022</a:t>
+              <a:t>01/26/2023</a:t>
             </a:fld>
             <a:endParaRPr lang="LID4096"/>
           </a:p>
@@ -2579,7 +2590,7 @@
           <a:p>
             <a:fld id="{3C1D8A52-78B7-4530-9FD6-785DEB7F4B66}" type="datetimeFigureOut">
               <a:rPr lang="LID4096" smtClean="0"/>
-              <a:t>11/23/2022</a:t>
+              <a:t>01/26/2023</a:t>
             </a:fld>
             <a:endParaRPr lang="LID4096"/>
           </a:p>
@@ -2868,7 +2879,7 @@
           <a:p>
             <a:fld id="{3C1D8A52-78B7-4530-9FD6-785DEB7F4B66}" type="datetimeFigureOut">
               <a:rPr lang="LID4096" smtClean="0"/>
-              <a:t>11/23/2022</a:t>
+              <a:t>01/26/2023</a:t>
             </a:fld>
             <a:endParaRPr lang="LID4096"/>
           </a:p>
@@ -3111,7 +3122,7 @@
           <a:p>
             <a:fld id="{3C1D8A52-78B7-4530-9FD6-785DEB7F4B66}" type="datetimeFigureOut">
               <a:rPr lang="LID4096" smtClean="0"/>
-              <a:t>11/23/2022</a:t>
+              <a:t>01/26/2023</a:t>
             </a:fld>
             <a:endParaRPr lang="LID4096"/>
           </a:p>
@@ -3540,10 +3551,10 @@
       </p:grpSpPr>
       <p:sp>
         <p:nvSpPr>
-          <p:cNvPr id="89" name="Rectangle 88">
-            <a:extLst>
-              <a:ext uri="{FF2B5EF4-FFF2-40B4-BE49-F238E27FC236}">
-                <a16:creationId xmlns:a16="http://schemas.microsoft.com/office/drawing/2014/main" id="{80F68FF9-1844-4577-AE79-1BACAEC493F4}"/>
+          <p:cNvPr id="77" name="Rectangle 76">
+            <a:extLst>
+              <a:ext uri="{FF2B5EF4-FFF2-40B4-BE49-F238E27FC236}">
+                <a16:creationId xmlns:a16="http://schemas.microsoft.com/office/drawing/2014/main" id="{8CAA45C2-3BCE-4AC3-BA7F-5EC2BC36597E}"/>
               </a:ext>
             </a:extLst>
           </p:cNvPr>
@@ -3552,8 +3563,320 @@
         </p:nvSpPr>
         <p:spPr>
           <a:xfrm>
+            <a:off x="9662332" y="1307124"/>
+            <a:ext cx="584200" cy="109610"/>
+          </a:xfrm>
+          <a:prstGeom prst="rect">
+            <a:avLst/>
+          </a:prstGeom>
+          <a:solidFill>
+            <a:srgbClr val="E36386"/>
+          </a:solidFill>
+          <a:ln>
+            <a:noFill/>
+          </a:ln>
+        </p:spPr>
+        <p:style>
+          <a:lnRef idx="2">
+            <a:schemeClr val="accent1">
+              <a:shade val="50000"/>
+            </a:schemeClr>
+          </a:lnRef>
+          <a:fillRef idx="1">
+            <a:schemeClr val="accent1"/>
+          </a:fillRef>
+          <a:effectRef idx="0">
+            <a:schemeClr val="accent1"/>
+          </a:effectRef>
+          <a:fontRef idx="minor">
+            <a:schemeClr val="lt1"/>
+          </a:fontRef>
+        </p:style>
+        <p:txBody>
+          <a:bodyPr rtlCol="0" anchor="ctr"/>
+          <a:lstStyle/>
+          <a:p>
+            <a:pPr algn="ctr"/>
+            <a:endParaRPr lang="LID4096" sz="1100"/>
+          </a:p>
+        </p:txBody>
+      </p:sp>
+      <p:sp>
+        <p:nvSpPr>
+          <p:cNvPr id="33" name="Rectangle 32">
+            <a:extLst>
+              <a:ext uri="{FF2B5EF4-FFF2-40B4-BE49-F238E27FC236}">
+                <a16:creationId xmlns:a16="http://schemas.microsoft.com/office/drawing/2014/main" id="{44945769-8DA5-4A52-A3FE-919E3F6EBD5E}"/>
+              </a:ext>
+            </a:extLst>
+          </p:cNvPr>
+          <p:cNvSpPr/>
+          <p:nvPr/>
+        </p:nvSpPr>
+        <p:spPr>
+          <a:xfrm>
+            <a:off x="8792683" y="1310153"/>
+            <a:ext cx="584200" cy="109610"/>
+          </a:xfrm>
+          <a:prstGeom prst="rect">
+            <a:avLst/>
+          </a:prstGeom>
+          <a:solidFill>
+            <a:srgbClr val="E36386"/>
+          </a:solidFill>
+          <a:ln>
+            <a:noFill/>
+          </a:ln>
+        </p:spPr>
+        <p:style>
+          <a:lnRef idx="2">
+            <a:schemeClr val="accent1">
+              <a:shade val="50000"/>
+            </a:schemeClr>
+          </a:lnRef>
+          <a:fillRef idx="1">
+            <a:schemeClr val="accent1"/>
+          </a:fillRef>
+          <a:effectRef idx="0">
+            <a:schemeClr val="accent1"/>
+          </a:effectRef>
+          <a:fontRef idx="minor">
+            <a:schemeClr val="lt1"/>
+          </a:fontRef>
+        </p:style>
+        <p:txBody>
+          <a:bodyPr rtlCol="0" anchor="ctr"/>
+          <a:lstStyle/>
+          <a:p>
+            <a:pPr algn="ctr"/>
+            <a:endParaRPr lang="LID4096" sz="1100" dirty="0"/>
+          </a:p>
+        </p:txBody>
+      </p:sp>
+      <p:sp>
+        <p:nvSpPr>
+          <p:cNvPr id="74" name="Rectangle 73">
+            <a:extLst>
+              <a:ext uri="{FF2B5EF4-FFF2-40B4-BE49-F238E27FC236}">
+                <a16:creationId xmlns:a16="http://schemas.microsoft.com/office/drawing/2014/main" id="{B8F3E414-CCCE-42DB-936E-10137867FE26}"/>
+              </a:ext>
+            </a:extLst>
+          </p:cNvPr>
+          <p:cNvSpPr/>
+          <p:nvPr/>
+        </p:nvSpPr>
+        <p:spPr>
+          <a:xfrm>
+            <a:off x="4043291" y="1299637"/>
+            <a:ext cx="141565" cy="109610"/>
+          </a:xfrm>
+          <a:prstGeom prst="rect">
+            <a:avLst/>
+          </a:prstGeom>
+          <a:solidFill>
+            <a:srgbClr val="E36386"/>
+          </a:solidFill>
+          <a:ln>
+            <a:noFill/>
+          </a:ln>
+        </p:spPr>
+        <p:style>
+          <a:lnRef idx="2">
+            <a:schemeClr val="accent1">
+              <a:shade val="50000"/>
+            </a:schemeClr>
+          </a:lnRef>
+          <a:fillRef idx="1">
+            <a:schemeClr val="accent1"/>
+          </a:fillRef>
+          <a:effectRef idx="0">
+            <a:schemeClr val="accent1"/>
+          </a:effectRef>
+          <a:fontRef idx="minor">
+            <a:schemeClr val="lt1"/>
+          </a:fontRef>
+        </p:style>
+        <p:txBody>
+          <a:bodyPr rtlCol="0" anchor="ctr"/>
+          <a:lstStyle/>
+          <a:p>
+            <a:pPr algn="ctr"/>
+            <a:endParaRPr lang="LID4096" sz="1100" dirty="0"/>
+          </a:p>
+        </p:txBody>
+      </p:sp>
+      <p:sp>
+        <p:nvSpPr>
+          <p:cNvPr id="32" name="Rectangle 31">
+            <a:extLst>
+              <a:ext uri="{FF2B5EF4-FFF2-40B4-BE49-F238E27FC236}">
+                <a16:creationId xmlns:a16="http://schemas.microsoft.com/office/drawing/2014/main" id="{99C3C2A0-08CB-41AB-9FA2-B1096A07BC9D}"/>
+              </a:ext>
+            </a:extLst>
+          </p:cNvPr>
+          <p:cNvSpPr/>
+          <p:nvPr/>
+        </p:nvSpPr>
+        <p:spPr>
+          <a:xfrm>
+            <a:off x="3195265" y="1299637"/>
+            <a:ext cx="230615" cy="109610"/>
+          </a:xfrm>
+          <a:prstGeom prst="rect">
+            <a:avLst/>
+          </a:prstGeom>
+          <a:solidFill>
+            <a:srgbClr val="E36386"/>
+          </a:solidFill>
+          <a:ln>
+            <a:noFill/>
+          </a:ln>
+        </p:spPr>
+        <p:style>
+          <a:lnRef idx="2">
+            <a:schemeClr val="accent1">
+              <a:shade val="50000"/>
+            </a:schemeClr>
+          </a:lnRef>
+          <a:fillRef idx="1">
+            <a:schemeClr val="accent1"/>
+          </a:fillRef>
+          <a:effectRef idx="0">
+            <a:schemeClr val="accent1"/>
+          </a:effectRef>
+          <a:fontRef idx="minor">
+            <a:schemeClr val="lt1"/>
+          </a:fontRef>
+        </p:style>
+        <p:txBody>
+          <a:bodyPr rtlCol="0" anchor="ctr"/>
+          <a:lstStyle/>
+          <a:p>
+            <a:pPr algn="ctr"/>
+            <a:endParaRPr lang="LID4096" sz="1100" dirty="0"/>
+          </a:p>
+        </p:txBody>
+      </p:sp>
+      <p:sp>
+        <p:nvSpPr>
+          <p:cNvPr id="84" name="Rectangle 83">
+            <a:extLst>
+              <a:ext uri="{FF2B5EF4-FFF2-40B4-BE49-F238E27FC236}">
+                <a16:creationId xmlns:a16="http://schemas.microsoft.com/office/drawing/2014/main" id="{CB369941-ED7E-403F-9246-FDDB1A28CEA4}"/>
+              </a:ext>
+            </a:extLst>
+          </p:cNvPr>
+          <p:cNvSpPr/>
+          <p:nvPr/>
+        </p:nvSpPr>
+        <p:spPr>
+          <a:xfrm>
+            <a:off x="10929710" y="1307124"/>
+            <a:ext cx="208044" cy="109610"/>
+          </a:xfrm>
+          <a:prstGeom prst="rect">
+            <a:avLst/>
+          </a:prstGeom>
+          <a:solidFill>
+            <a:srgbClr val="E36386"/>
+          </a:solidFill>
+          <a:ln>
+            <a:noFill/>
+          </a:ln>
+        </p:spPr>
+        <p:style>
+          <a:lnRef idx="2">
+            <a:schemeClr val="accent1">
+              <a:shade val="50000"/>
+            </a:schemeClr>
+          </a:lnRef>
+          <a:fillRef idx="1">
+            <a:schemeClr val="accent1"/>
+          </a:fillRef>
+          <a:effectRef idx="0">
+            <a:schemeClr val="accent1"/>
+          </a:effectRef>
+          <a:fontRef idx="minor">
+            <a:schemeClr val="lt1"/>
+          </a:fontRef>
+        </p:style>
+        <p:txBody>
+          <a:bodyPr rtlCol="0" anchor="ctr"/>
+          <a:lstStyle/>
+          <a:p>
+            <a:pPr algn="ctr"/>
+            <a:endParaRPr lang="LID4096" sz="1400" dirty="0"/>
+          </a:p>
+        </p:txBody>
+      </p:sp>
+      <p:sp>
+        <p:nvSpPr>
+          <p:cNvPr id="100" name="Rectangle 99">
+            <a:extLst>
+              <a:ext uri="{FF2B5EF4-FFF2-40B4-BE49-F238E27FC236}">
+                <a16:creationId xmlns:a16="http://schemas.microsoft.com/office/drawing/2014/main" id="{0742A856-8E0F-4704-BA78-58190536C0C0}"/>
+              </a:ext>
+            </a:extLst>
+          </p:cNvPr>
+          <p:cNvSpPr/>
+          <p:nvPr/>
+        </p:nvSpPr>
+        <p:spPr>
+          <a:xfrm>
+            <a:off x="11713230" y="1307124"/>
+            <a:ext cx="208044" cy="109610"/>
+          </a:xfrm>
+          <a:prstGeom prst="rect">
+            <a:avLst/>
+          </a:prstGeom>
+          <a:solidFill>
+            <a:srgbClr val="E36386"/>
+          </a:solidFill>
+          <a:ln>
+            <a:noFill/>
+          </a:ln>
+        </p:spPr>
+        <p:style>
+          <a:lnRef idx="2">
+            <a:schemeClr val="accent1">
+              <a:shade val="50000"/>
+            </a:schemeClr>
+          </a:lnRef>
+          <a:fillRef idx="1">
+            <a:schemeClr val="accent1"/>
+          </a:fillRef>
+          <a:effectRef idx="0">
+            <a:schemeClr val="accent1"/>
+          </a:effectRef>
+          <a:fontRef idx="minor">
+            <a:schemeClr val="lt1"/>
+          </a:fontRef>
+        </p:style>
+        <p:txBody>
+          <a:bodyPr rtlCol="0" anchor="ctr"/>
+          <a:lstStyle/>
+          <a:p>
+            <a:pPr algn="ctr"/>
+            <a:endParaRPr lang="LID4096" sz="1400" dirty="0"/>
+          </a:p>
+        </p:txBody>
+      </p:sp>
+      <p:sp>
+        <p:nvSpPr>
+          <p:cNvPr id="89" name="Rectangle 88">
+            <a:extLst>
+              <a:ext uri="{FF2B5EF4-FFF2-40B4-BE49-F238E27FC236}">
+                <a16:creationId xmlns:a16="http://schemas.microsoft.com/office/drawing/2014/main" id="{80F68FF9-1844-4577-AE79-1BACAEC493F4}"/>
+              </a:ext>
+            </a:extLst>
+          </p:cNvPr>
+          <p:cNvSpPr/>
+          <p:nvPr/>
+        </p:nvSpPr>
+        <p:spPr>
+          <a:xfrm>
             <a:off x="-290287" y="449943"/>
-            <a:ext cx="13237029" cy="1804226"/>
+            <a:ext cx="13237029" cy="2091844"/>
           </a:xfrm>
           <a:prstGeom prst="rect">
             <a:avLst/>
@@ -3589,19 +3912,27 @@
           <a:p>
             <a:pPr algn="ctr"/>
             <a:r>
-              <a:rPr lang="en-US" sz="1400" dirty="0"/>
+              <a:rPr lang="en-US" sz="1400" dirty="0">
+                <a:solidFill>
+                  <a:schemeClr val="tx1"/>
+                </a:solidFill>
+              </a:rPr>
               <a:t>Specifications</a:t>
             </a:r>
-            <a:endParaRPr lang="LID4096" sz="1400" dirty="0"/>
-          </a:p>
-        </p:txBody>
-      </p:sp>
-      <p:sp>
-        <p:nvSpPr>
-          <p:cNvPr id="88" name="Rectangle 87">
-            <a:extLst>
-              <a:ext uri="{FF2B5EF4-FFF2-40B4-BE49-F238E27FC236}">
-                <a16:creationId xmlns:a16="http://schemas.microsoft.com/office/drawing/2014/main" id="{F89CF50A-F301-4362-BD4A-1DED4D56A310}"/>
+            <a:endParaRPr lang="LID4096" sz="1400" dirty="0">
+              <a:solidFill>
+                <a:schemeClr val="tx1"/>
+              </a:solidFill>
+            </a:endParaRPr>
+          </a:p>
+        </p:txBody>
+      </p:sp>
+      <p:sp>
+        <p:nvSpPr>
+          <p:cNvPr id="16" name="Rectangle 15">
+            <a:extLst>
+              <a:ext uri="{FF2B5EF4-FFF2-40B4-BE49-F238E27FC236}">
+                <a16:creationId xmlns:a16="http://schemas.microsoft.com/office/drawing/2014/main" id="{1C770EA0-C71E-40CE-B0E2-FBBD822A45F4}"/>
               </a:ext>
             </a:extLst>
           </p:cNvPr>
@@ -3610,8 +3941,176 @@
         </p:nvSpPr>
         <p:spPr>
           <a:xfrm>
-            <a:off x="-290287" y="2254847"/>
-            <a:ext cx="13237029" cy="1259838"/>
+            <a:off x="8630167" y="1300089"/>
+            <a:ext cx="1778000" cy="900000"/>
+          </a:xfrm>
+          <a:prstGeom prst="rect">
+            <a:avLst/>
+          </a:prstGeom>
+          <a:solidFill>
+            <a:srgbClr val="E36386"/>
+          </a:solidFill>
+          <a:ln>
+            <a:noFill/>
+          </a:ln>
+        </p:spPr>
+        <p:style>
+          <a:lnRef idx="2">
+            <a:schemeClr val="accent1">
+              <a:shade val="50000"/>
+            </a:schemeClr>
+          </a:lnRef>
+          <a:fillRef idx="1">
+            <a:schemeClr val="accent1"/>
+          </a:fillRef>
+          <a:effectRef idx="0">
+            <a:schemeClr val="accent1"/>
+          </a:effectRef>
+          <a:fontRef idx="minor">
+            <a:schemeClr val="lt1"/>
+          </a:fontRef>
+        </p:style>
+        <p:txBody>
+          <a:bodyPr rtlCol="0" anchor="ctr"/>
+          <a:lstStyle/>
+          <a:p>
+            <a:pPr algn="ctr"/>
+            <a:r>
+              <a:rPr lang="en-US" sz="1400" dirty="0"/>
+              <a:t>Reference Architecture (RA2) for Kubernetes based cloud infrastructure</a:t>
+            </a:r>
+            <a:endParaRPr lang="LID4096" sz="1400" dirty="0"/>
+          </a:p>
+        </p:txBody>
+      </p:sp>
+      <p:sp>
+        <p:nvSpPr>
+          <p:cNvPr id="14" name="Rectangle 13">
+            <a:extLst>
+              <a:ext uri="{FF2B5EF4-FFF2-40B4-BE49-F238E27FC236}">
+                <a16:creationId xmlns:a16="http://schemas.microsoft.com/office/drawing/2014/main" id="{E2809B15-734E-4B42-AB72-36458D659C02}"/>
+              </a:ext>
+            </a:extLst>
+          </p:cNvPr>
+          <p:cNvSpPr/>
+          <p:nvPr/>
+        </p:nvSpPr>
+        <p:spPr>
+          <a:xfrm>
+            <a:off x="10562266" y="1300089"/>
+            <a:ext cx="1778000" cy="900000"/>
+          </a:xfrm>
+          <a:prstGeom prst="rect">
+            <a:avLst/>
+          </a:prstGeom>
+          <a:solidFill>
+            <a:srgbClr val="E36386"/>
+          </a:solidFill>
+          <a:ln>
+            <a:noFill/>
+          </a:ln>
+        </p:spPr>
+        <p:style>
+          <a:lnRef idx="2">
+            <a:schemeClr val="accent1">
+              <a:shade val="50000"/>
+            </a:schemeClr>
+          </a:lnRef>
+          <a:fillRef idx="1">
+            <a:schemeClr val="accent1"/>
+          </a:fillRef>
+          <a:effectRef idx="0">
+            <a:schemeClr val="accent1"/>
+          </a:effectRef>
+          <a:fontRef idx="minor">
+            <a:schemeClr val="lt1"/>
+          </a:fontRef>
+        </p:style>
+        <p:txBody>
+          <a:bodyPr rtlCol="0" anchor="ctr"/>
+          <a:lstStyle/>
+          <a:p>
+            <a:pPr algn="ctr"/>
+            <a:r>
+              <a:rPr lang="en-US" sz="1400" dirty="0"/>
+              <a:t>Reference Model (RM)</a:t>
+            </a:r>
+            <a:endParaRPr lang="LID4096" sz="1400" dirty="0"/>
+          </a:p>
+        </p:txBody>
+      </p:sp>
+      <p:sp>
+        <p:nvSpPr>
+          <p:cNvPr id="15" name="Rectangle 14">
+            <a:extLst>
+              <a:ext uri="{FF2B5EF4-FFF2-40B4-BE49-F238E27FC236}">
+                <a16:creationId xmlns:a16="http://schemas.microsoft.com/office/drawing/2014/main" id="{6BB91390-0496-436E-AB6E-D3DB589DEDDC}"/>
+              </a:ext>
+            </a:extLst>
+          </p:cNvPr>
+          <p:cNvSpPr/>
+          <p:nvPr/>
+        </p:nvSpPr>
+        <p:spPr>
+          <a:xfrm>
+            <a:off x="2830305" y="1300089"/>
+            <a:ext cx="1778000" cy="900000"/>
+          </a:xfrm>
+          <a:prstGeom prst="rect">
+            <a:avLst/>
+          </a:prstGeom>
+          <a:solidFill>
+            <a:srgbClr val="E36386"/>
+          </a:solidFill>
+          <a:ln>
+            <a:noFill/>
+          </a:ln>
+        </p:spPr>
+        <p:style>
+          <a:lnRef idx="2">
+            <a:schemeClr val="accent1">
+              <a:shade val="50000"/>
+            </a:schemeClr>
+          </a:lnRef>
+          <a:fillRef idx="1">
+            <a:schemeClr val="accent1"/>
+          </a:fillRef>
+          <a:effectRef idx="0">
+            <a:schemeClr val="accent1"/>
+          </a:effectRef>
+          <a:fontRef idx="minor">
+            <a:schemeClr val="lt1"/>
+          </a:fontRef>
+        </p:style>
+        <p:txBody>
+          <a:bodyPr rtlCol="0" anchor="ctr"/>
+          <a:lstStyle/>
+          <a:p>
+            <a:pPr algn="ctr"/>
+            <a:r>
+              <a:rPr lang="en-US" sz="1400" dirty="0"/>
+              <a:t>Reference Architecture (RA1) for OpenStack based cloud infrastructure</a:t>
+            </a:r>
+            <a:endParaRPr lang="LID4096" sz="1400" dirty="0"/>
+          </a:p>
+        </p:txBody>
+      </p:sp>
+      <p:sp>
+        <p:nvSpPr>
+          <p:cNvPr id="88" name="Rectangle 87">
+            <a:extLst>
+              <a:ext uri="{FF2B5EF4-FFF2-40B4-BE49-F238E27FC236}">
+                <a16:creationId xmlns:a16="http://schemas.microsoft.com/office/drawing/2014/main" id="{F89CF50A-F301-4362-BD4A-1DED4D56A310}"/>
+              </a:ext>
+            </a:extLst>
+          </p:cNvPr>
+          <p:cNvSpPr/>
+          <p:nvPr/>
+        </p:nvSpPr>
+        <p:spPr>
+          <a:xfrm>
+            <a:off x="-290287" y="2541787"/>
+            <a:ext cx="13237029" cy="1260289"/>
           </a:xfrm>
           <a:prstGeom prst="rect">
             <a:avLst/>
@@ -3647,10 +4146,18 @@
           <a:p>
             <a:pPr algn="ctr"/>
             <a:r>
-              <a:rPr lang="en-US" sz="1400" dirty="0"/>
+              <a:rPr lang="en-US" sz="1400" dirty="0">
+                <a:solidFill>
+                  <a:schemeClr val="tx1"/>
+                </a:solidFill>
+              </a:rPr>
               <a:t>Integration projects</a:t>
             </a:r>
-            <a:endParaRPr lang="LID4096" sz="1400" dirty="0"/>
+            <a:endParaRPr lang="LID4096" sz="1400" dirty="0">
+              <a:solidFill>
+                <a:schemeClr val="tx1"/>
+              </a:solidFill>
+            </a:endParaRPr>
           </a:p>
         </p:txBody>
       </p:sp>
@@ -3668,7 +4175,7 @@
         </p:nvSpPr>
         <p:spPr>
           <a:xfrm>
-            <a:off x="-290286" y="3514911"/>
+            <a:off x="-290286" y="3802302"/>
             <a:ext cx="13237029" cy="1259838"/>
           </a:xfrm>
           <a:prstGeom prst="rect">
@@ -3705,10 +4212,18 @@
           <a:p>
             <a:pPr algn="ctr"/>
             <a:r>
-              <a:rPr lang="en-US" sz="1400" dirty="0"/>
+              <a:rPr lang="en-US" sz="1400" dirty="0">
+                <a:solidFill>
+                  <a:schemeClr val="tx1"/>
+                </a:solidFill>
+              </a:rPr>
               <a:t>Testing projects</a:t>
             </a:r>
-            <a:endParaRPr lang="LID4096" sz="1400" dirty="0"/>
+            <a:endParaRPr lang="LID4096" sz="1400" dirty="0">
+              <a:solidFill>
+                <a:schemeClr val="tx1"/>
+              </a:solidFill>
+            </a:endParaRPr>
           </a:p>
         </p:txBody>
       </p:sp>
@@ -3726,7 +4241,7 @@
         </p:nvSpPr>
         <p:spPr>
           <a:xfrm>
-            <a:off x="-290286" y="4775201"/>
+            <a:off x="-290286" y="5062592"/>
             <a:ext cx="13237029" cy="1259838"/>
           </a:xfrm>
           <a:prstGeom prst="rect">
@@ -3763,474 +4278,27 @@
           <a:p>
             <a:pPr algn="ctr"/>
             <a:r>
-              <a:rPr lang="en-US" sz="1400" dirty="0"/>
+              <a:rPr lang="en-US" sz="1400" dirty="0">
+                <a:solidFill>
+                  <a:schemeClr val="tx1"/>
+                </a:solidFill>
+              </a:rPr>
               <a:t>Implementation projects</a:t>
             </a:r>
-            <a:endParaRPr lang="LID4096" sz="1400" dirty="0"/>
-          </a:p>
-        </p:txBody>
-      </p:sp>
-      <p:grpSp>
-        <p:nvGrpSpPr>
-          <p:cNvPr id="23" name="Group 22">
-            <a:extLst>
-              <a:ext uri="{FF2B5EF4-FFF2-40B4-BE49-F238E27FC236}">
-                <a16:creationId xmlns:a16="http://schemas.microsoft.com/office/drawing/2014/main" id="{4071180A-759F-4B5F-8D35-C301D1431A66}"/>
-              </a:ext>
-            </a:extLst>
-          </p:cNvPr>
-          <p:cNvGrpSpPr/>
-          <p:nvPr/>
-        </p:nvGrpSpPr>
-        <p:grpSpPr>
-          <a:xfrm>
-            <a:off x="901767" y="5044439"/>
-            <a:ext cx="3713662" cy="721360"/>
-            <a:chOff x="2091938" y="5407296"/>
-            <a:chExt cx="3713662" cy="721360"/>
-          </a:xfrm>
-        </p:grpSpPr>
-        <p:sp>
-          <p:nvSpPr>
-            <p:cNvPr id="6" name="Rectangle 5">
-              <a:extLst>
-                <a:ext uri="{FF2B5EF4-FFF2-40B4-BE49-F238E27FC236}">
-                  <a16:creationId xmlns:a16="http://schemas.microsoft.com/office/drawing/2014/main" id="{9400D57A-6D89-454D-81BC-41536018C3ED}"/>
-                </a:ext>
-              </a:extLst>
-            </p:cNvPr>
-            <p:cNvSpPr/>
-            <p:nvPr/>
-          </p:nvSpPr>
-          <p:spPr>
-            <a:xfrm>
-              <a:off x="2091938" y="5407296"/>
-              <a:ext cx="1778000" cy="721360"/>
-            </a:xfrm>
-            <a:prstGeom prst="rect">
-              <a:avLst/>
-            </a:prstGeom>
-            <a:solidFill>
-              <a:srgbClr val="6BDAD5"/>
-            </a:solidFill>
-            <a:ln>
-              <a:noFill/>
-            </a:ln>
-          </p:spPr>
-          <p:style>
-            <a:lnRef idx="2">
-              <a:schemeClr val="accent1">
-                <a:shade val="50000"/>
-              </a:schemeClr>
-            </a:lnRef>
-            <a:fillRef idx="1">
-              <a:schemeClr val="accent1"/>
-            </a:fillRef>
-            <a:effectRef idx="0">
-              <a:schemeClr val="accent1"/>
-            </a:effectRef>
-            <a:fontRef idx="minor">
-              <a:schemeClr val="lt1"/>
-            </a:fontRef>
-          </p:style>
-          <p:txBody>
-            <a:bodyPr rtlCol="0" anchor="ctr"/>
-            <a:lstStyle/>
-            <a:p>
-              <a:pPr algn="ctr"/>
-              <a:r>
-                <a:rPr lang="en-US" dirty="0"/>
-                <a:t>Barometer</a:t>
-              </a:r>
-              <a:endParaRPr lang="LID4096" dirty="0"/>
-            </a:p>
-          </p:txBody>
-        </p:sp>
-        <p:sp>
-          <p:nvSpPr>
-            <p:cNvPr id="10" name="Rectangle 9">
-              <a:extLst>
-                <a:ext uri="{FF2B5EF4-FFF2-40B4-BE49-F238E27FC236}">
-                  <a16:creationId xmlns:a16="http://schemas.microsoft.com/office/drawing/2014/main" id="{0D721FB5-9219-4A90-A798-544809865C07}"/>
-                </a:ext>
-              </a:extLst>
-            </p:cNvPr>
-            <p:cNvSpPr/>
-            <p:nvPr/>
-          </p:nvSpPr>
-          <p:spPr>
-            <a:xfrm>
-              <a:off x="4027600" y="5407296"/>
-              <a:ext cx="1778000" cy="721360"/>
-            </a:xfrm>
-            <a:prstGeom prst="rect">
-              <a:avLst/>
-            </a:prstGeom>
-            <a:solidFill>
-              <a:srgbClr val="6BDAD5"/>
-            </a:solidFill>
-            <a:ln>
-              <a:noFill/>
-            </a:ln>
-          </p:spPr>
-          <p:style>
-            <a:lnRef idx="2">
-              <a:schemeClr val="accent1">
-                <a:shade val="50000"/>
-              </a:schemeClr>
-            </a:lnRef>
-            <a:fillRef idx="1">
-              <a:schemeClr val="accent1"/>
-            </a:fillRef>
-            <a:effectRef idx="0">
-              <a:schemeClr val="accent1"/>
-            </a:effectRef>
-            <a:fontRef idx="minor">
-              <a:schemeClr val="lt1"/>
-            </a:fontRef>
-          </p:style>
-          <p:txBody>
-            <a:bodyPr rtlCol="0" anchor="ctr"/>
-            <a:lstStyle/>
-            <a:p>
-              <a:pPr algn="ctr"/>
-              <a:r>
-                <a:rPr lang="en-US" dirty="0"/>
-                <a:t>Thoth</a:t>
-              </a:r>
-              <a:endParaRPr lang="LID4096" dirty="0"/>
-            </a:p>
-          </p:txBody>
-        </p:sp>
-      </p:grpSp>
-      <p:grpSp>
-        <p:nvGrpSpPr>
-          <p:cNvPr id="21" name="Group 20">
-            <a:extLst>
-              <a:ext uri="{FF2B5EF4-FFF2-40B4-BE49-F238E27FC236}">
-                <a16:creationId xmlns:a16="http://schemas.microsoft.com/office/drawing/2014/main" id="{2235AC0A-9024-4902-9C4D-0C4587CFC867}"/>
-              </a:ext>
-            </a:extLst>
-          </p:cNvPr>
-          <p:cNvGrpSpPr/>
-          <p:nvPr/>
-        </p:nvGrpSpPr>
-        <p:grpSpPr>
-          <a:xfrm>
-            <a:off x="904530" y="2552439"/>
-            <a:ext cx="3710899" cy="721360"/>
-            <a:chOff x="2094701" y="3614531"/>
-            <a:chExt cx="3710899" cy="721360"/>
-          </a:xfrm>
-        </p:grpSpPr>
-        <p:sp>
-          <p:nvSpPr>
-            <p:cNvPr id="11" name="Rectangle 10">
-              <a:extLst>
-                <a:ext uri="{FF2B5EF4-FFF2-40B4-BE49-F238E27FC236}">
-                  <a16:creationId xmlns:a16="http://schemas.microsoft.com/office/drawing/2014/main" id="{66D842DB-377E-4081-A0C1-1E0BF3AB17EF}"/>
-                </a:ext>
-              </a:extLst>
-            </p:cNvPr>
-            <p:cNvSpPr/>
-            <p:nvPr/>
-          </p:nvSpPr>
-          <p:spPr>
-            <a:xfrm>
-              <a:off x="2094701" y="3614531"/>
-              <a:ext cx="1778000" cy="721360"/>
-            </a:xfrm>
-            <a:prstGeom prst="rect">
-              <a:avLst/>
-            </a:prstGeom>
-            <a:solidFill>
-              <a:srgbClr val="F5B335"/>
-            </a:solidFill>
-            <a:ln>
-              <a:noFill/>
-            </a:ln>
-          </p:spPr>
-          <p:style>
-            <a:lnRef idx="2">
-              <a:schemeClr val="accent1">
-                <a:shade val="50000"/>
-              </a:schemeClr>
-            </a:lnRef>
-            <a:fillRef idx="1">
-              <a:schemeClr val="accent1"/>
-            </a:fillRef>
-            <a:effectRef idx="0">
-              <a:schemeClr val="accent1"/>
-            </a:effectRef>
-            <a:fontRef idx="minor">
-              <a:schemeClr val="lt1"/>
-            </a:fontRef>
-          </p:style>
-          <p:txBody>
-            <a:bodyPr rtlCol="0" anchor="ctr"/>
-            <a:lstStyle/>
-            <a:p>
-              <a:pPr algn="ctr"/>
-              <a:r>
-                <a:rPr lang="en-US" dirty="0"/>
-                <a:t>CIRV</a:t>
-              </a:r>
-              <a:endParaRPr lang="LID4096" dirty="0"/>
-            </a:p>
-          </p:txBody>
-        </p:sp>
-        <p:sp>
-          <p:nvSpPr>
-            <p:cNvPr id="12" name="Rectangle 11">
-              <a:extLst>
-                <a:ext uri="{FF2B5EF4-FFF2-40B4-BE49-F238E27FC236}">
-                  <a16:creationId xmlns:a16="http://schemas.microsoft.com/office/drawing/2014/main" id="{6D87B812-4EC5-455E-9E58-9D979B6B91D4}"/>
-                </a:ext>
-              </a:extLst>
-            </p:cNvPr>
-            <p:cNvSpPr/>
-            <p:nvPr/>
-          </p:nvSpPr>
-          <p:spPr>
-            <a:xfrm>
-              <a:off x="4027600" y="3614531"/>
-              <a:ext cx="1778000" cy="721360"/>
-            </a:xfrm>
-            <a:prstGeom prst="rect">
-              <a:avLst/>
-            </a:prstGeom>
-            <a:solidFill>
-              <a:srgbClr val="F5B335"/>
-            </a:solidFill>
-            <a:ln>
-              <a:noFill/>
-            </a:ln>
-          </p:spPr>
-          <p:style>
-            <a:lnRef idx="2">
-              <a:schemeClr val="accent1">
-                <a:shade val="50000"/>
-              </a:schemeClr>
-            </a:lnRef>
-            <a:fillRef idx="1">
-              <a:schemeClr val="accent1"/>
-            </a:fillRef>
-            <a:effectRef idx="0">
-              <a:schemeClr val="accent1"/>
-            </a:effectRef>
-            <a:fontRef idx="minor">
-              <a:schemeClr val="lt1"/>
-            </a:fontRef>
-          </p:style>
-          <p:txBody>
-            <a:bodyPr rtlCol="0" anchor="ctr"/>
-            <a:lstStyle/>
-            <a:p>
-              <a:pPr algn="ctr"/>
-              <a:r>
-                <a:rPr lang="en-US" dirty="0" err="1"/>
-                <a:t>Kuberef</a:t>
-              </a:r>
-              <a:endParaRPr lang="LID4096" dirty="0"/>
-            </a:p>
-          </p:txBody>
-        </p:sp>
-      </p:grpSp>
-      <p:grpSp>
-        <p:nvGrpSpPr>
-          <p:cNvPr id="22" name="Group 21">
-            <a:extLst>
-              <a:ext uri="{FF2B5EF4-FFF2-40B4-BE49-F238E27FC236}">
-                <a16:creationId xmlns:a16="http://schemas.microsoft.com/office/drawing/2014/main" id="{0AF37A6D-2F92-49AC-A04C-FBE350F81BF1}"/>
-              </a:ext>
-            </a:extLst>
-          </p:cNvPr>
-          <p:cNvGrpSpPr/>
-          <p:nvPr/>
-        </p:nvGrpSpPr>
-        <p:grpSpPr>
-          <a:xfrm>
-            <a:off x="901767" y="3798439"/>
-            <a:ext cx="5638638" cy="721360"/>
-            <a:chOff x="2099062" y="4536118"/>
-            <a:chExt cx="5638638" cy="721360"/>
-          </a:xfrm>
-        </p:grpSpPr>
-        <p:sp>
-          <p:nvSpPr>
-            <p:cNvPr id="7" name="Rectangle 6">
-              <a:extLst>
-                <a:ext uri="{FF2B5EF4-FFF2-40B4-BE49-F238E27FC236}">
-                  <a16:creationId xmlns:a16="http://schemas.microsoft.com/office/drawing/2014/main" id="{BD02EE54-823C-47D7-95DA-A82543736087}"/>
-                </a:ext>
-              </a:extLst>
-            </p:cNvPr>
-            <p:cNvSpPr/>
-            <p:nvPr/>
-          </p:nvSpPr>
-          <p:spPr>
-            <a:xfrm>
-              <a:off x="5959700" y="4536118"/>
-              <a:ext cx="1778000" cy="721360"/>
-            </a:xfrm>
-            <a:prstGeom prst="rect">
-              <a:avLst/>
-            </a:prstGeom>
-            <a:solidFill>
-              <a:srgbClr val="007473"/>
-            </a:solidFill>
-            <a:ln>
-              <a:noFill/>
-            </a:ln>
-          </p:spPr>
-          <p:style>
-            <a:lnRef idx="2">
-              <a:schemeClr val="accent1">
-                <a:shade val="50000"/>
-              </a:schemeClr>
-            </a:lnRef>
-            <a:fillRef idx="1">
-              <a:schemeClr val="accent1"/>
-            </a:fillRef>
-            <a:effectRef idx="0">
-              <a:schemeClr val="accent1"/>
-            </a:effectRef>
-            <a:fontRef idx="minor">
-              <a:schemeClr val="lt1"/>
-            </a:fontRef>
-          </p:style>
-          <p:txBody>
-            <a:bodyPr rtlCol="0" anchor="ctr"/>
-            <a:lstStyle/>
-            <a:p>
-              <a:pPr algn="ctr"/>
-              <a:r>
-                <a:rPr lang="en-US" dirty="0" err="1"/>
-                <a:t>Functest</a:t>
-              </a:r>
-              <a:endParaRPr lang="LID4096" dirty="0"/>
-            </a:p>
-          </p:txBody>
-        </p:sp>
-        <p:sp>
-          <p:nvSpPr>
-            <p:cNvPr id="9" name="Rectangle 8">
-              <a:extLst>
-                <a:ext uri="{FF2B5EF4-FFF2-40B4-BE49-F238E27FC236}">
-                  <a16:creationId xmlns:a16="http://schemas.microsoft.com/office/drawing/2014/main" id="{EEE496F8-5056-486F-B3FE-39016D9E24C4}"/>
-                </a:ext>
-              </a:extLst>
-            </p:cNvPr>
-            <p:cNvSpPr/>
-            <p:nvPr/>
-          </p:nvSpPr>
-          <p:spPr>
-            <a:xfrm>
-              <a:off x="2099062" y="4536118"/>
-              <a:ext cx="1778000" cy="721360"/>
-            </a:xfrm>
-            <a:prstGeom prst="rect">
-              <a:avLst/>
-            </a:prstGeom>
-            <a:solidFill>
-              <a:srgbClr val="007473"/>
-            </a:solidFill>
-            <a:ln>
-              <a:noFill/>
-            </a:ln>
-          </p:spPr>
-          <p:style>
-            <a:lnRef idx="2">
-              <a:schemeClr val="accent1">
-                <a:shade val="50000"/>
-              </a:schemeClr>
-            </a:lnRef>
-            <a:fillRef idx="1">
-              <a:schemeClr val="accent1"/>
-            </a:fillRef>
-            <a:effectRef idx="0">
-              <a:schemeClr val="accent1"/>
-            </a:effectRef>
-            <a:fontRef idx="minor">
-              <a:schemeClr val="lt1"/>
-            </a:fontRef>
-          </p:style>
-          <p:txBody>
-            <a:bodyPr rtlCol="0" anchor="ctr"/>
-            <a:lstStyle/>
-            <a:p>
-              <a:pPr algn="ctr"/>
-              <a:r>
-                <a:rPr lang="en-US" dirty="0" err="1"/>
-                <a:t>ViNePERF</a:t>
-              </a:r>
-              <a:endParaRPr lang="LID4096" dirty="0"/>
-            </a:p>
-          </p:txBody>
-        </p:sp>
-        <p:sp>
-          <p:nvSpPr>
-            <p:cNvPr id="13" name="Rectangle 12">
-              <a:extLst>
-                <a:ext uri="{FF2B5EF4-FFF2-40B4-BE49-F238E27FC236}">
-                  <a16:creationId xmlns:a16="http://schemas.microsoft.com/office/drawing/2014/main" id="{31618119-EF3D-4A1E-B156-2DC5E6B7333B}"/>
-                </a:ext>
-              </a:extLst>
-            </p:cNvPr>
-            <p:cNvSpPr/>
-            <p:nvPr/>
-          </p:nvSpPr>
-          <p:spPr>
-            <a:xfrm>
-              <a:off x="4027600" y="4536118"/>
-              <a:ext cx="1778000" cy="721360"/>
-            </a:xfrm>
-            <a:prstGeom prst="rect">
-              <a:avLst/>
-            </a:prstGeom>
-            <a:solidFill>
-              <a:srgbClr val="007473"/>
-            </a:solidFill>
-            <a:ln>
-              <a:noFill/>
-            </a:ln>
-          </p:spPr>
-          <p:style>
-            <a:lnRef idx="2">
-              <a:schemeClr val="accent1">
-                <a:shade val="50000"/>
-              </a:schemeClr>
-            </a:lnRef>
-            <a:fillRef idx="1">
-              <a:schemeClr val="accent1"/>
-            </a:fillRef>
-            <a:effectRef idx="0">
-              <a:schemeClr val="accent1"/>
-            </a:effectRef>
-            <a:fontRef idx="minor">
-              <a:schemeClr val="lt1"/>
-            </a:fontRef>
-          </p:style>
-          <p:txBody>
-            <a:bodyPr rtlCol="0" anchor="ctr"/>
-            <a:lstStyle/>
-            <a:p>
-              <a:pPr algn="ctr"/>
-              <a:r>
-                <a:rPr lang="en-US" dirty="0" err="1"/>
-                <a:t>StorPerf</a:t>
-              </a:r>
-              <a:endParaRPr lang="LID4096" dirty="0"/>
-            </a:p>
-          </p:txBody>
-        </p:sp>
-      </p:grpSp>
-      <p:sp>
-        <p:nvSpPr>
-          <p:cNvPr id="14" name="Rectangle 13">
-            <a:extLst>
-              <a:ext uri="{FF2B5EF4-FFF2-40B4-BE49-F238E27FC236}">
-                <a16:creationId xmlns:a16="http://schemas.microsoft.com/office/drawing/2014/main" id="{E2809B15-734E-4B42-AB72-36458D659C02}"/>
+            <a:endParaRPr lang="LID4096" sz="1400" dirty="0">
+              <a:solidFill>
+                <a:schemeClr val="tx1"/>
+              </a:solidFill>
+            </a:endParaRPr>
+          </a:p>
+        </p:txBody>
+      </p:sp>
+      <p:sp>
+        <p:nvSpPr>
+          <p:cNvPr id="6" name="Rectangle 5">
+            <a:extLst>
+              <a:ext uri="{FF2B5EF4-FFF2-40B4-BE49-F238E27FC236}">
+                <a16:creationId xmlns:a16="http://schemas.microsoft.com/office/drawing/2014/main" id="{9400D57A-6D89-454D-81BC-41536018C3ED}"/>
               </a:ext>
             </a:extLst>
           </p:cNvPr>
@@ -4239,8 +4307,344 @@
         </p:nvSpPr>
         <p:spPr>
           <a:xfrm>
-            <a:off x="10562266" y="1300089"/>
+            <a:off x="904530" y="5331830"/>
             <a:ext cx="1778000" cy="721360"/>
+          </a:xfrm>
+          <a:prstGeom prst="rect">
+            <a:avLst/>
+          </a:prstGeom>
+          <a:solidFill>
+            <a:srgbClr val="6BDAD5"/>
+          </a:solidFill>
+          <a:ln>
+            <a:noFill/>
+          </a:ln>
+        </p:spPr>
+        <p:style>
+          <a:lnRef idx="2">
+            <a:schemeClr val="accent1">
+              <a:shade val="50000"/>
+            </a:schemeClr>
+          </a:lnRef>
+          <a:fillRef idx="1">
+            <a:schemeClr val="accent1"/>
+          </a:fillRef>
+          <a:effectRef idx="0">
+            <a:schemeClr val="accent1"/>
+          </a:effectRef>
+          <a:fontRef idx="minor">
+            <a:schemeClr val="lt1"/>
+          </a:fontRef>
+        </p:style>
+        <p:txBody>
+          <a:bodyPr rtlCol="0" anchor="ctr"/>
+          <a:lstStyle/>
+          <a:p>
+            <a:pPr algn="ctr"/>
+            <a:r>
+              <a:rPr lang="en-US" sz="1600" dirty="0"/>
+              <a:t>Barometer</a:t>
+            </a:r>
+            <a:endParaRPr lang="LID4096" dirty="0"/>
+          </a:p>
+        </p:txBody>
+      </p:sp>
+      <p:sp>
+        <p:nvSpPr>
+          <p:cNvPr id="10" name="Rectangle 9">
+            <a:extLst>
+              <a:ext uri="{FF2B5EF4-FFF2-40B4-BE49-F238E27FC236}">
+                <a16:creationId xmlns:a16="http://schemas.microsoft.com/office/drawing/2014/main" id="{0D721FB5-9219-4A90-A798-544809865C07}"/>
+              </a:ext>
+            </a:extLst>
+          </p:cNvPr>
+          <p:cNvSpPr/>
+          <p:nvPr/>
+        </p:nvSpPr>
+        <p:spPr>
+          <a:xfrm>
+            <a:off x="2830305" y="5331830"/>
+            <a:ext cx="1778000" cy="721360"/>
+          </a:xfrm>
+          <a:prstGeom prst="rect">
+            <a:avLst/>
+          </a:prstGeom>
+          <a:solidFill>
+            <a:srgbClr val="6BDAD5"/>
+          </a:solidFill>
+          <a:ln>
+            <a:noFill/>
+          </a:ln>
+        </p:spPr>
+        <p:style>
+          <a:lnRef idx="2">
+            <a:schemeClr val="accent1">
+              <a:shade val="50000"/>
+            </a:schemeClr>
+          </a:lnRef>
+          <a:fillRef idx="1">
+            <a:schemeClr val="accent1"/>
+          </a:fillRef>
+          <a:effectRef idx="0">
+            <a:schemeClr val="accent1"/>
+          </a:effectRef>
+          <a:fontRef idx="minor">
+            <a:schemeClr val="lt1"/>
+          </a:fontRef>
+        </p:style>
+        <p:txBody>
+          <a:bodyPr rtlCol="0" anchor="ctr"/>
+          <a:lstStyle/>
+          <a:p>
+            <a:pPr algn="ctr"/>
+            <a:r>
+              <a:rPr lang="en-US" sz="1600" dirty="0"/>
+              <a:t>Thoth</a:t>
+            </a:r>
+            <a:endParaRPr lang="LID4096" sz="1600" dirty="0"/>
+          </a:p>
+        </p:txBody>
+      </p:sp>
+      <p:sp>
+        <p:nvSpPr>
+          <p:cNvPr id="12" name="Rectangle 11">
+            <a:extLst>
+              <a:ext uri="{FF2B5EF4-FFF2-40B4-BE49-F238E27FC236}">
+                <a16:creationId xmlns:a16="http://schemas.microsoft.com/office/drawing/2014/main" id="{6D87B812-4EC5-455E-9E58-9D979B6B91D4}"/>
+              </a:ext>
+            </a:extLst>
+          </p:cNvPr>
+          <p:cNvSpPr/>
+          <p:nvPr/>
+        </p:nvSpPr>
+        <p:spPr>
+          <a:xfrm>
+            <a:off x="2830305" y="2839830"/>
+            <a:ext cx="1778000" cy="721360"/>
+          </a:xfrm>
+          <a:prstGeom prst="rect">
+            <a:avLst/>
+          </a:prstGeom>
+          <a:solidFill>
+            <a:srgbClr val="F5B335"/>
+          </a:solidFill>
+          <a:ln>
+            <a:noFill/>
+          </a:ln>
+        </p:spPr>
+        <p:style>
+          <a:lnRef idx="2">
+            <a:schemeClr val="accent1">
+              <a:shade val="50000"/>
+            </a:schemeClr>
+          </a:lnRef>
+          <a:fillRef idx="1">
+            <a:schemeClr val="accent1"/>
+          </a:fillRef>
+          <a:effectRef idx="0">
+            <a:schemeClr val="accent1"/>
+          </a:effectRef>
+          <a:fontRef idx="minor">
+            <a:schemeClr val="lt1"/>
+          </a:fontRef>
+        </p:style>
+        <p:txBody>
+          <a:bodyPr rtlCol="0" anchor="ctr"/>
+          <a:lstStyle/>
+          <a:p>
+            <a:pPr algn="ctr"/>
+            <a:r>
+              <a:rPr lang="en-US" sz="1600" dirty="0"/>
+              <a:t>Kuberef</a:t>
+            </a:r>
+            <a:endParaRPr lang="LID4096" dirty="0"/>
+          </a:p>
+        </p:txBody>
+      </p:sp>
+      <p:sp>
+        <p:nvSpPr>
+          <p:cNvPr id="7" name="Rectangle 6">
+            <a:extLst>
+              <a:ext uri="{FF2B5EF4-FFF2-40B4-BE49-F238E27FC236}">
+                <a16:creationId xmlns:a16="http://schemas.microsoft.com/office/drawing/2014/main" id="{BD02EE54-823C-47D7-95DA-A82543736087}"/>
+              </a:ext>
+            </a:extLst>
+          </p:cNvPr>
+          <p:cNvSpPr/>
+          <p:nvPr/>
+        </p:nvSpPr>
+        <p:spPr>
+          <a:xfrm>
+            <a:off x="4762405" y="4085830"/>
+            <a:ext cx="1778000" cy="721360"/>
+          </a:xfrm>
+          <a:prstGeom prst="rect">
+            <a:avLst/>
+          </a:prstGeom>
+          <a:solidFill>
+            <a:srgbClr val="007473"/>
+          </a:solidFill>
+          <a:ln>
+            <a:noFill/>
+          </a:ln>
+        </p:spPr>
+        <p:style>
+          <a:lnRef idx="2">
+            <a:schemeClr val="accent1">
+              <a:shade val="50000"/>
+            </a:schemeClr>
+          </a:lnRef>
+          <a:fillRef idx="1">
+            <a:schemeClr val="accent1"/>
+          </a:fillRef>
+          <a:effectRef idx="0">
+            <a:schemeClr val="accent1"/>
+          </a:effectRef>
+          <a:fontRef idx="minor">
+            <a:schemeClr val="lt1"/>
+          </a:fontRef>
+        </p:style>
+        <p:txBody>
+          <a:bodyPr rtlCol="0" anchor="ctr"/>
+          <a:lstStyle/>
+          <a:p>
+            <a:pPr algn="ctr"/>
+            <a:r>
+              <a:rPr lang="en-US" sz="1400" dirty="0"/>
+              <a:t>Functest</a:t>
+            </a:r>
+            <a:endParaRPr lang="LID4096" sz="1400" dirty="0"/>
+          </a:p>
+        </p:txBody>
+      </p:sp>
+      <p:sp>
+        <p:nvSpPr>
+          <p:cNvPr id="9" name="Rectangle 8">
+            <a:extLst>
+              <a:ext uri="{FF2B5EF4-FFF2-40B4-BE49-F238E27FC236}">
+                <a16:creationId xmlns:a16="http://schemas.microsoft.com/office/drawing/2014/main" id="{EEE496F8-5056-486F-B3FE-39016D9E24C4}"/>
+              </a:ext>
+            </a:extLst>
+          </p:cNvPr>
+          <p:cNvSpPr/>
+          <p:nvPr/>
+        </p:nvSpPr>
+        <p:spPr>
+          <a:xfrm>
+            <a:off x="904530" y="4085830"/>
+            <a:ext cx="1778000" cy="721360"/>
+          </a:xfrm>
+          <a:prstGeom prst="rect">
+            <a:avLst/>
+          </a:prstGeom>
+          <a:solidFill>
+            <a:srgbClr val="007473"/>
+          </a:solidFill>
+          <a:ln>
+            <a:noFill/>
+          </a:ln>
+        </p:spPr>
+        <p:style>
+          <a:lnRef idx="2">
+            <a:schemeClr val="accent1">
+              <a:shade val="50000"/>
+            </a:schemeClr>
+          </a:lnRef>
+          <a:fillRef idx="1">
+            <a:schemeClr val="accent1"/>
+          </a:fillRef>
+          <a:effectRef idx="0">
+            <a:schemeClr val="accent1"/>
+          </a:effectRef>
+          <a:fontRef idx="minor">
+            <a:schemeClr val="lt1"/>
+          </a:fontRef>
+        </p:style>
+        <p:txBody>
+          <a:bodyPr rtlCol="0" anchor="ctr"/>
+          <a:lstStyle/>
+          <a:p>
+            <a:pPr algn="ctr"/>
+            <a:r>
+              <a:rPr lang="en-US" sz="1600" dirty="0"/>
+              <a:t>ViNePERF</a:t>
+            </a:r>
+            <a:endParaRPr lang="LID4096" dirty="0"/>
+          </a:p>
+        </p:txBody>
+      </p:sp>
+      <p:sp>
+        <p:nvSpPr>
+          <p:cNvPr id="13" name="Rectangle 12">
+            <a:extLst>
+              <a:ext uri="{FF2B5EF4-FFF2-40B4-BE49-F238E27FC236}">
+                <a16:creationId xmlns:a16="http://schemas.microsoft.com/office/drawing/2014/main" id="{31618119-EF3D-4A1E-B156-2DC5E6B7333B}"/>
+              </a:ext>
+            </a:extLst>
+          </p:cNvPr>
+          <p:cNvSpPr/>
+          <p:nvPr/>
+        </p:nvSpPr>
+        <p:spPr>
+          <a:xfrm>
+            <a:off x="2830305" y="4085830"/>
+            <a:ext cx="1778000" cy="721360"/>
+          </a:xfrm>
+          <a:prstGeom prst="rect">
+            <a:avLst/>
+          </a:prstGeom>
+          <a:solidFill>
+            <a:srgbClr val="007473"/>
+          </a:solidFill>
+          <a:ln>
+            <a:noFill/>
+          </a:ln>
+        </p:spPr>
+        <p:style>
+          <a:lnRef idx="2">
+            <a:schemeClr val="accent1">
+              <a:shade val="50000"/>
+            </a:schemeClr>
+          </a:lnRef>
+          <a:fillRef idx="1">
+            <a:schemeClr val="accent1"/>
+          </a:fillRef>
+          <a:effectRef idx="0">
+            <a:schemeClr val="accent1"/>
+          </a:effectRef>
+          <a:fontRef idx="minor">
+            <a:schemeClr val="lt1"/>
+          </a:fontRef>
+        </p:style>
+        <p:txBody>
+          <a:bodyPr rtlCol="0" anchor="ctr"/>
+          <a:lstStyle/>
+          <a:p>
+            <a:pPr algn="ctr"/>
+            <a:r>
+              <a:rPr lang="en-US" sz="1600" dirty="0"/>
+              <a:t>StorPerf</a:t>
+            </a:r>
+            <a:endParaRPr lang="LID4096" sz="1600" dirty="0"/>
+          </a:p>
+        </p:txBody>
+      </p:sp>
+      <p:sp>
+        <p:nvSpPr>
+          <p:cNvPr id="17" name="Rectangle 16">
+            <a:extLst>
+              <a:ext uri="{FF2B5EF4-FFF2-40B4-BE49-F238E27FC236}">
+                <a16:creationId xmlns:a16="http://schemas.microsoft.com/office/drawing/2014/main" id="{50131D6F-8518-4392-8F3B-BA036A53445E}"/>
+              </a:ext>
+            </a:extLst>
+          </p:cNvPr>
+          <p:cNvSpPr/>
+          <p:nvPr/>
+        </p:nvSpPr>
+        <p:spPr>
+          <a:xfrm>
+            <a:off x="6704416" y="1300089"/>
+            <a:ext cx="1778000" cy="900000"/>
           </a:xfrm>
           <a:prstGeom prst="rect">
             <a:avLst/>
@@ -4274,19 +4678,19 @@
           <a:p>
             <a:pPr algn="ctr"/>
             <a:r>
-              <a:rPr lang="en-US" sz="1100" dirty="0"/>
-              <a:t>Reference Model (RM)</a:t>
-            </a:r>
-            <a:endParaRPr lang="LID4096" sz="1100" dirty="0"/>
-          </a:p>
-        </p:txBody>
-      </p:sp>
-      <p:sp>
-        <p:nvSpPr>
-          <p:cNvPr id="17" name="Rectangle 16">
-            <a:extLst>
-              <a:ext uri="{FF2B5EF4-FFF2-40B4-BE49-F238E27FC236}">
-                <a16:creationId xmlns:a16="http://schemas.microsoft.com/office/drawing/2014/main" id="{50131D6F-8518-4392-8F3B-BA036A53445E}"/>
+              <a:rPr lang="en-US" sz="1400" dirty="0"/>
+              <a:t>Reference Conformance (RC2) for RA2 based Implementations</a:t>
+            </a:r>
+            <a:endParaRPr lang="LID4096" sz="1400" dirty="0"/>
+          </a:p>
+        </p:txBody>
+      </p:sp>
+      <p:sp>
+        <p:nvSpPr>
+          <p:cNvPr id="18" name="Rectangle 17">
+            <a:extLst>
+              <a:ext uri="{FF2B5EF4-FFF2-40B4-BE49-F238E27FC236}">
+                <a16:creationId xmlns:a16="http://schemas.microsoft.com/office/drawing/2014/main" id="{93BC562B-CA03-4A28-8C30-2BE917E61B8C}"/>
               </a:ext>
             </a:extLst>
           </p:cNvPr>
@@ -4295,8 +4699,8 @@
         </p:nvSpPr>
         <p:spPr>
           <a:xfrm>
-            <a:off x="6704416" y="1300089"/>
-            <a:ext cx="1778000" cy="721360"/>
+            <a:off x="904530" y="1300089"/>
+            <a:ext cx="1778000" cy="900000"/>
           </a:xfrm>
           <a:prstGeom prst="rect">
             <a:avLst/>
@@ -4330,19 +4734,19 @@
           <a:p>
             <a:pPr algn="ctr"/>
             <a:r>
-              <a:rPr lang="en-US" sz="1100" dirty="0"/>
-              <a:t>Reference Conformance (RC2) for RA2 based Implementations</a:t>
-            </a:r>
-            <a:endParaRPr lang="LID4096" sz="1100" dirty="0"/>
-          </a:p>
-        </p:txBody>
-      </p:sp>
-      <p:sp>
-        <p:nvSpPr>
-          <p:cNvPr id="18" name="Rectangle 17">
-            <a:extLst>
-              <a:ext uri="{FF2B5EF4-FFF2-40B4-BE49-F238E27FC236}">
-                <a16:creationId xmlns:a16="http://schemas.microsoft.com/office/drawing/2014/main" id="{93BC562B-CA03-4A28-8C30-2BE917E61B8C}"/>
+              <a:rPr lang="en-US" sz="1400" dirty="0"/>
+              <a:t>Reference Implementation based on RA1 specifications (RI1)</a:t>
+            </a:r>
+            <a:endParaRPr lang="LID4096" sz="1400" dirty="0"/>
+          </a:p>
+        </p:txBody>
+      </p:sp>
+      <p:sp>
+        <p:nvSpPr>
+          <p:cNvPr id="19" name="Rectangle 18">
+            <a:extLst>
+              <a:ext uri="{FF2B5EF4-FFF2-40B4-BE49-F238E27FC236}">
+                <a16:creationId xmlns:a16="http://schemas.microsoft.com/office/drawing/2014/main" id="{225A5FD2-0D69-48E5-AA56-0989C03A3AAD}"/>
               </a:ext>
             </a:extLst>
           </p:cNvPr>
@@ -4351,8 +4755,8 @@
         </p:nvSpPr>
         <p:spPr>
           <a:xfrm>
-            <a:off x="901767" y="1300089"/>
-            <a:ext cx="1778000" cy="721360"/>
+            <a:off x="4762405" y="1300089"/>
+            <a:ext cx="1778000" cy="900000"/>
           </a:xfrm>
           <a:prstGeom prst="rect">
             <a:avLst/>
@@ -4386,350 +4790,37 @@
           <a:p>
             <a:pPr algn="ctr"/>
             <a:r>
-              <a:rPr lang="en-US" sz="1100" dirty="0"/>
-              <a:t>Reference Implementation based on RA1 specifications (RI1)</a:t>
-            </a:r>
-            <a:endParaRPr lang="LID4096" sz="1100" dirty="0"/>
-          </a:p>
-        </p:txBody>
-      </p:sp>
-      <p:sp>
-        <p:nvSpPr>
-          <p:cNvPr id="19" name="Rectangle 18">
-            <a:extLst>
-              <a:ext uri="{FF2B5EF4-FFF2-40B4-BE49-F238E27FC236}">
-                <a16:creationId xmlns:a16="http://schemas.microsoft.com/office/drawing/2014/main" id="{225A5FD2-0D69-48E5-AA56-0989C03A3AAD}"/>
-              </a:ext>
-            </a:extLst>
-          </p:cNvPr>
-          <p:cNvSpPr/>
-          <p:nvPr/>
-        </p:nvSpPr>
-        <p:spPr>
-          <a:xfrm>
-            <a:off x="4772316" y="1300089"/>
-            <a:ext cx="1778000" cy="721360"/>
-          </a:xfrm>
-          <a:prstGeom prst="rect">
-            <a:avLst/>
-          </a:prstGeom>
-          <a:solidFill>
-            <a:srgbClr val="E36386"/>
-          </a:solidFill>
-          <a:ln>
-            <a:noFill/>
-          </a:ln>
-        </p:spPr>
-        <p:style>
-          <a:lnRef idx="2">
-            <a:schemeClr val="accent1">
-              <a:shade val="50000"/>
-            </a:schemeClr>
-          </a:lnRef>
-          <a:fillRef idx="1">
-            <a:schemeClr val="accent1"/>
-          </a:fillRef>
-          <a:effectRef idx="0">
-            <a:schemeClr val="accent1"/>
-          </a:effectRef>
-          <a:fontRef idx="minor">
-            <a:schemeClr val="lt1"/>
-          </a:fontRef>
-        </p:style>
-        <p:txBody>
-          <a:bodyPr rtlCol="0" anchor="ctr"/>
-          <a:lstStyle/>
-          <a:p>
-            <a:pPr algn="ctr"/>
-            <a:r>
-              <a:rPr lang="en-US" sz="1100" dirty="0"/>
+              <a:rPr lang="en-US" sz="1400" dirty="0"/>
               <a:t>Reference Implementation based on RA2 specifications (RI2)</a:t>
             </a:r>
-            <a:endParaRPr lang="LID4096" sz="1100" dirty="0"/>
-          </a:p>
-        </p:txBody>
-      </p:sp>
-      <p:grpSp>
-        <p:nvGrpSpPr>
-          <p:cNvPr id="46" name="Group 45">
-            <a:extLst>
-              <a:ext uri="{FF2B5EF4-FFF2-40B4-BE49-F238E27FC236}">
-                <a16:creationId xmlns:a16="http://schemas.microsoft.com/office/drawing/2014/main" id="{695B2E96-2C9D-4E22-8CFA-6B0AEFFC2F0D}"/>
-              </a:ext>
-            </a:extLst>
-          </p:cNvPr>
-          <p:cNvGrpSpPr/>
-          <p:nvPr/>
-        </p:nvGrpSpPr>
-        <p:grpSpPr>
-          <a:xfrm>
-            <a:off x="2830305" y="1300089"/>
-            <a:ext cx="1778000" cy="721360"/>
-            <a:chOff x="6698067" y="1306439"/>
-            <a:chExt cx="1778000" cy="721360"/>
-          </a:xfrm>
-        </p:grpSpPr>
-        <p:sp>
-          <p:nvSpPr>
-            <p:cNvPr id="15" name="Rectangle 14">
-              <a:extLst>
-                <a:ext uri="{FF2B5EF4-FFF2-40B4-BE49-F238E27FC236}">
-                  <a16:creationId xmlns:a16="http://schemas.microsoft.com/office/drawing/2014/main" id="{6BB91390-0496-436E-AB6E-D3DB589DEDDC}"/>
-                </a:ext>
-              </a:extLst>
-            </p:cNvPr>
-            <p:cNvSpPr/>
-            <p:nvPr/>
-          </p:nvSpPr>
-          <p:spPr>
-            <a:xfrm>
-              <a:off x="6698067" y="1306439"/>
-              <a:ext cx="1778000" cy="721360"/>
-            </a:xfrm>
-            <a:prstGeom prst="rect">
-              <a:avLst/>
-            </a:prstGeom>
-            <a:solidFill>
-              <a:srgbClr val="E36386"/>
-            </a:solidFill>
-            <a:ln>
-              <a:noFill/>
-            </a:ln>
-          </p:spPr>
-          <p:style>
-            <a:lnRef idx="2">
-              <a:schemeClr val="accent1">
-                <a:shade val="50000"/>
-              </a:schemeClr>
-            </a:lnRef>
-            <a:fillRef idx="1">
-              <a:schemeClr val="accent1"/>
-            </a:fillRef>
-            <a:effectRef idx="0">
-              <a:schemeClr val="accent1"/>
-            </a:effectRef>
-            <a:fontRef idx="minor">
-              <a:schemeClr val="lt1"/>
-            </a:fontRef>
-          </p:style>
-          <p:txBody>
-            <a:bodyPr rtlCol="0" anchor="ctr"/>
-            <a:lstStyle/>
-            <a:p>
-              <a:pPr algn="ctr"/>
-              <a:r>
-                <a:rPr lang="en-US" sz="1100" dirty="0"/>
-                <a:t>Reference Architecture (RA1) for OpenStack based cloud infrastructure</a:t>
-              </a:r>
-              <a:endParaRPr lang="LID4096" sz="1100" dirty="0"/>
-            </a:p>
-          </p:txBody>
-        </p:sp>
-        <p:sp>
-          <p:nvSpPr>
-            <p:cNvPr id="32" name="Rectangle 31">
-              <a:extLst>
-                <a:ext uri="{FF2B5EF4-FFF2-40B4-BE49-F238E27FC236}">
-                  <a16:creationId xmlns:a16="http://schemas.microsoft.com/office/drawing/2014/main" id="{99C3C2A0-08CB-41AB-9FA2-B1096A07BC9D}"/>
-                </a:ext>
-              </a:extLst>
-            </p:cNvPr>
-            <p:cNvSpPr/>
-            <p:nvPr/>
-          </p:nvSpPr>
-          <p:spPr>
-            <a:xfrm>
-              <a:off x="6855116" y="1312791"/>
-              <a:ext cx="584200" cy="109610"/>
-            </a:xfrm>
-            <a:prstGeom prst="rect">
-              <a:avLst/>
-            </a:prstGeom>
-            <a:solidFill>
-              <a:srgbClr val="E36386"/>
-            </a:solidFill>
-            <a:ln>
-              <a:noFill/>
-            </a:ln>
-          </p:spPr>
-          <p:style>
-            <a:lnRef idx="2">
-              <a:schemeClr val="accent1">
-                <a:shade val="50000"/>
-              </a:schemeClr>
-            </a:lnRef>
-            <a:fillRef idx="1">
-              <a:schemeClr val="accent1"/>
-            </a:fillRef>
-            <a:effectRef idx="0">
-              <a:schemeClr val="accent1"/>
-            </a:effectRef>
-            <a:fontRef idx="minor">
-              <a:schemeClr val="lt1"/>
-            </a:fontRef>
-          </p:style>
-          <p:txBody>
-            <a:bodyPr rtlCol="0" anchor="ctr"/>
-            <a:lstStyle/>
-            <a:p>
-              <a:pPr algn="ctr"/>
-              <a:endParaRPr lang="LID4096" sz="1100"/>
-            </a:p>
-          </p:txBody>
-        </p:sp>
-      </p:grpSp>
-      <p:grpSp>
-        <p:nvGrpSpPr>
-          <p:cNvPr id="47" name="Group 46">
-            <a:extLst>
-              <a:ext uri="{FF2B5EF4-FFF2-40B4-BE49-F238E27FC236}">
-                <a16:creationId xmlns:a16="http://schemas.microsoft.com/office/drawing/2014/main" id="{25EAC336-13F8-4E7B-BEF7-2EC6404FAEB2}"/>
-              </a:ext>
-            </a:extLst>
-          </p:cNvPr>
-          <p:cNvGrpSpPr/>
-          <p:nvPr/>
-        </p:nvGrpSpPr>
-        <p:grpSpPr>
-          <a:xfrm>
-            <a:off x="8630167" y="1300089"/>
-            <a:ext cx="1778000" cy="721360"/>
-            <a:chOff x="8630167" y="1306439"/>
-            <a:chExt cx="1778000" cy="721360"/>
-          </a:xfrm>
-        </p:grpSpPr>
-        <p:sp>
-          <p:nvSpPr>
-            <p:cNvPr id="16" name="Rectangle 15">
-              <a:extLst>
-                <a:ext uri="{FF2B5EF4-FFF2-40B4-BE49-F238E27FC236}">
-                  <a16:creationId xmlns:a16="http://schemas.microsoft.com/office/drawing/2014/main" id="{1C770EA0-C71E-40CE-B0E2-FBBD822A45F4}"/>
-                </a:ext>
-              </a:extLst>
-            </p:cNvPr>
-            <p:cNvSpPr/>
-            <p:nvPr/>
-          </p:nvSpPr>
-          <p:spPr>
-            <a:xfrm>
-              <a:off x="8630167" y="1306439"/>
-              <a:ext cx="1778000" cy="721360"/>
-            </a:xfrm>
-            <a:prstGeom prst="rect">
-              <a:avLst/>
-            </a:prstGeom>
-            <a:solidFill>
-              <a:srgbClr val="E36386"/>
-            </a:solidFill>
-            <a:ln>
-              <a:noFill/>
-            </a:ln>
-          </p:spPr>
-          <p:style>
-            <a:lnRef idx="2">
-              <a:schemeClr val="accent1">
-                <a:shade val="50000"/>
-              </a:schemeClr>
-            </a:lnRef>
-            <a:fillRef idx="1">
-              <a:schemeClr val="accent1"/>
-            </a:fillRef>
-            <a:effectRef idx="0">
-              <a:schemeClr val="accent1"/>
-            </a:effectRef>
-            <a:fontRef idx="minor">
-              <a:schemeClr val="lt1"/>
-            </a:fontRef>
-          </p:style>
-          <p:txBody>
-            <a:bodyPr rtlCol="0" anchor="ctr"/>
-            <a:lstStyle/>
-            <a:p>
-              <a:pPr algn="ctr"/>
-              <a:r>
-                <a:rPr lang="en-US" sz="1100" dirty="0"/>
-                <a:t>Reference Architecture (RA2) for Kubernetes based cloud infrastructure</a:t>
-              </a:r>
-              <a:endParaRPr lang="LID4096" sz="1100" dirty="0"/>
-            </a:p>
-          </p:txBody>
-        </p:sp>
-        <p:sp>
-          <p:nvSpPr>
-            <p:cNvPr id="33" name="Rectangle 32">
-              <a:extLst>
-                <a:ext uri="{FF2B5EF4-FFF2-40B4-BE49-F238E27FC236}">
-                  <a16:creationId xmlns:a16="http://schemas.microsoft.com/office/drawing/2014/main" id="{44945769-8DA5-4A52-A3FE-919E3F6EBD5E}"/>
-                </a:ext>
-              </a:extLst>
-            </p:cNvPr>
-            <p:cNvSpPr/>
-            <p:nvPr/>
-          </p:nvSpPr>
-          <p:spPr>
-            <a:xfrm>
-              <a:off x="8787216" y="1312791"/>
-              <a:ext cx="584200" cy="109610"/>
-            </a:xfrm>
-            <a:prstGeom prst="rect">
-              <a:avLst/>
-            </a:prstGeom>
-            <a:solidFill>
-              <a:srgbClr val="E36386"/>
-            </a:solidFill>
-            <a:ln>
-              <a:noFill/>
-            </a:ln>
-          </p:spPr>
-          <p:style>
-            <a:lnRef idx="2">
-              <a:schemeClr val="accent1">
-                <a:shade val="50000"/>
-              </a:schemeClr>
-            </a:lnRef>
-            <a:fillRef idx="1">
-              <a:schemeClr val="accent1"/>
-            </a:fillRef>
-            <a:effectRef idx="0">
-              <a:schemeClr val="accent1"/>
-            </a:effectRef>
-            <a:fontRef idx="minor">
-              <a:schemeClr val="lt1"/>
-            </a:fontRef>
-          </p:style>
-          <p:txBody>
-            <a:bodyPr rtlCol="0" anchor="ctr"/>
-            <a:lstStyle/>
-            <a:p>
-              <a:pPr algn="ctr"/>
-              <a:endParaRPr lang="LID4096" sz="1100"/>
-            </a:p>
-          </p:txBody>
-        </p:sp>
-      </p:grpSp>
+            <a:endParaRPr lang="LID4096" sz="1400" dirty="0"/>
+          </a:p>
+        </p:txBody>
+      </p:sp>
       <p:cxnSp>
         <p:nvCxnSpPr>
-          <p:cNvPr id="51" name="Connector: Elbow 50">
-            <a:extLst>
-              <a:ext uri="{FF2B5EF4-FFF2-40B4-BE49-F238E27FC236}">
-                <a16:creationId xmlns:a16="http://schemas.microsoft.com/office/drawing/2014/main" id="{1F38E091-6118-4C79-980E-A129C175B4DF}"/>
+          <p:cNvPr id="68" name="Connector: Elbow 67">
+            <a:extLst>
+              <a:ext uri="{FF2B5EF4-FFF2-40B4-BE49-F238E27FC236}">
+                <a16:creationId xmlns:a16="http://schemas.microsoft.com/office/drawing/2014/main" id="{976E3311-0FED-4180-898B-68F47FEFCB72}"/>
               </a:ext>
             </a:extLst>
           </p:cNvPr>
           <p:cNvCxnSpPr>
-            <a:stCxn id="16" idx="0"/>
-            <a:endCxn id="14" idx="0"/>
+            <a:cxnSpLocks/>
+            <a:stCxn id="18" idx="0"/>
+            <a:endCxn id="32" idx="0"/>
           </p:cNvCxnSpPr>
           <p:nvPr/>
         </p:nvCxnSpPr>
         <p:spPr>
           <a:xfrm rot="5400000" flipH="1" flipV="1">
-            <a:off x="10485216" y="334040"/>
-            <a:ext cx="12700" cy="1932099"/>
+            <a:off x="2551825" y="541342"/>
+            <a:ext cx="452" cy="1517043"/>
           </a:xfrm>
           <a:prstGeom prst="bentConnector3">
             <a:avLst>
-              <a:gd name="adj1" fmla="val 2250000"/>
+              <a:gd name="adj1" fmla="val 50675221"/>
             </a:avLst>
           </a:prstGeom>
           <a:ln w="28575">
@@ -4757,220 +4848,24 @@
       </p:cxnSp>
       <p:cxnSp>
         <p:nvCxnSpPr>
-          <p:cNvPr id="53" name="Connector: Elbow 52">
-            <a:extLst>
-              <a:ext uri="{FF2B5EF4-FFF2-40B4-BE49-F238E27FC236}">
-                <a16:creationId xmlns:a16="http://schemas.microsoft.com/office/drawing/2014/main" id="{7A87703B-5D50-42BF-BF10-F8F8DB519012}"/>
+          <p:cNvPr id="75" name="Connector: Elbow 74">
+            <a:extLst>
+              <a:ext uri="{FF2B5EF4-FFF2-40B4-BE49-F238E27FC236}">
+                <a16:creationId xmlns:a16="http://schemas.microsoft.com/office/drawing/2014/main" id="{5102CC9A-6D74-423D-BB6C-897415534CAA}"/>
               </a:ext>
             </a:extLst>
           </p:cNvPr>
           <p:cNvCxnSpPr>
             <a:cxnSpLocks/>
-            <a:stCxn id="17" idx="0"/>
-            <a:endCxn id="33" idx="0"/>
+            <a:stCxn id="12" idx="0"/>
+            <a:endCxn id="19" idx="2"/>
           </p:cNvCxnSpPr>
           <p:nvPr/>
         </p:nvCxnSpPr>
         <p:spPr>
-          <a:xfrm rot="16200000" flipH="1">
-            <a:off x="8333190" y="560315"/>
-            <a:ext cx="6352" cy="1485900"/>
-          </a:xfrm>
-          <a:prstGeom prst="bentConnector3">
-            <a:avLst>
-              <a:gd name="adj1" fmla="val -4348630"/>
-            </a:avLst>
-          </a:prstGeom>
-          <a:ln w="28575">
-            <a:solidFill>
-              <a:schemeClr val="tx1"/>
-            </a:solidFill>
-            <a:prstDash val="sysDash"/>
-            <a:tailEnd type="triangle"/>
-          </a:ln>
-        </p:spPr>
-        <p:style>
-          <a:lnRef idx="1">
-            <a:schemeClr val="accent1"/>
-          </a:lnRef>
-          <a:fillRef idx="0">
-            <a:schemeClr val="accent1"/>
-          </a:fillRef>
-          <a:effectRef idx="0">
-            <a:schemeClr val="accent1"/>
-          </a:effectRef>
-          <a:fontRef idx="minor">
-            <a:schemeClr val="tx1"/>
-          </a:fontRef>
-        </p:style>
-      </p:cxnSp>
-      <p:cxnSp>
-        <p:nvCxnSpPr>
-          <p:cNvPr id="57" name="Connector: Elbow 56">
-            <a:extLst>
-              <a:ext uri="{FF2B5EF4-FFF2-40B4-BE49-F238E27FC236}">
-                <a16:creationId xmlns:a16="http://schemas.microsoft.com/office/drawing/2014/main" id="{1F12C40E-1C47-4A57-A2A4-04CB3AF5BE1B}"/>
-              </a:ext>
-            </a:extLst>
-          </p:cNvPr>
-          <p:cNvCxnSpPr>
-            <a:cxnSpLocks/>
-            <a:stCxn id="19" idx="0"/>
-            <a:endCxn id="33" idx="0"/>
-          </p:cNvCxnSpPr>
-          <p:nvPr/>
-        </p:nvCxnSpPr>
-        <p:spPr>
-          <a:xfrm rot="16200000" flipH="1">
-            <a:off x="7367140" y="-405735"/>
-            <a:ext cx="6352" cy="3418000"/>
-          </a:xfrm>
-          <a:prstGeom prst="bentConnector3">
-            <a:avLst>
-              <a:gd name="adj1" fmla="val -7197733"/>
-            </a:avLst>
-          </a:prstGeom>
-          <a:ln w="28575">
-            <a:solidFill>
-              <a:schemeClr val="tx1"/>
-            </a:solidFill>
-            <a:prstDash val="sysDash"/>
-            <a:tailEnd type="triangle"/>
-          </a:ln>
-        </p:spPr>
-        <p:style>
-          <a:lnRef idx="1">
-            <a:schemeClr val="accent1"/>
-          </a:lnRef>
-          <a:fillRef idx="0">
-            <a:schemeClr val="accent1"/>
-          </a:fillRef>
-          <a:effectRef idx="0">
-            <a:schemeClr val="accent1"/>
-          </a:effectRef>
-          <a:fontRef idx="minor">
-            <a:schemeClr val="tx1"/>
-          </a:fontRef>
-        </p:style>
-      </p:cxnSp>
-      <p:cxnSp>
-        <p:nvCxnSpPr>
-          <p:cNvPr id="61" name="Connector: Elbow 60">
-            <a:extLst>
-              <a:ext uri="{FF2B5EF4-FFF2-40B4-BE49-F238E27FC236}">
-                <a16:creationId xmlns:a16="http://schemas.microsoft.com/office/drawing/2014/main" id="{779A8198-989E-4B85-AC62-EFB285A8076F}"/>
-              </a:ext>
-            </a:extLst>
-          </p:cNvPr>
-          <p:cNvCxnSpPr>
-            <a:cxnSpLocks/>
-            <a:stCxn id="15" idx="0"/>
-            <a:endCxn id="14" idx="0"/>
-          </p:cNvCxnSpPr>
-          <p:nvPr/>
-        </p:nvCxnSpPr>
-        <p:spPr>
           <a:xfrm rot="5400000" flipH="1" flipV="1">
-            <a:off x="7585285" y="-2565891"/>
-            <a:ext cx="12700" cy="7731961"/>
-          </a:xfrm>
-          <a:prstGeom prst="bentConnector3">
-            <a:avLst>
-              <a:gd name="adj1" fmla="val 5400000"/>
-            </a:avLst>
-          </a:prstGeom>
-          <a:ln w="28575">
-            <a:solidFill>
-              <a:schemeClr val="tx1"/>
-            </a:solidFill>
-            <a:prstDash val="sysDash"/>
-            <a:tailEnd type="triangle"/>
-          </a:ln>
-        </p:spPr>
-        <p:style>
-          <a:lnRef idx="1">
-            <a:schemeClr val="accent1"/>
-          </a:lnRef>
-          <a:fillRef idx="0">
-            <a:schemeClr val="accent1"/>
-          </a:fillRef>
-          <a:effectRef idx="0">
-            <a:schemeClr val="accent1"/>
-          </a:effectRef>
-          <a:fontRef idx="minor">
-            <a:schemeClr val="tx1"/>
-          </a:fontRef>
-        </p:style>
-      </p:cxnSp>
-      <p:cxnSp>
-        <p:nvCxnSpPr>
-          <p:cNvPr id="68" name="Connector: Elbow 67">
-            <a:extLst>
-              <a:ext uri="{FF2B5EF4-FFF2-40B4-BE49-F238E27FC236}">
-                <a16:creationId xmlns:a16="http://schemas.microsoft.com/office/drawing/2014/main" id="{976E3311-0FED-4180-898B-68F47FEFCB72}"/>
-              </a:ext>
-            </a:extLst>
-          </p:cNvPr>
-          <p:cNvCxnSpPr>
-            <a:cxnSpLocks/>
-            <a:stCxn id="18" idx="0"/>
-            <a:endCxn id="32" idx="0"/>
-          </p:cNvCxnSpPr>
-          <p:nvPr/>
-        </p:nvCxnSpPr>
-        <p:spPr>
-          <a:xfrm rot="16200000" flipH="1">
-            <a:off x="2531934" y="558922"/>
-            <a:ext cx="6352" cy="1488687"/>
-          </a:xfrm>
-          <a:prstGeom prst="bentConnector3">
-            <a:avLst>
-              <a:gd name="adj1" fmla="val -3598866"/>
-            </a:avLst>
-          </a:prstGeom>
-          <a:ln w="28575">
-            <a:solidFill>
-              <a:schemeClr val="tx1"/>
-            </a:solidFill>
-            <a:prstDash val="sysDash"/>
-            <a:tailEnd type="triangle"/>
-          </a:ln>
-        </p:spPr>
-        <p:style>
-          <a:lnRef idx="1">
-            <a:schemeClr val="accent1"/>
-          </a:lnRef>
-          <a:fillRef idx="0">
-            <a:schemeClr val="accent1"/>
-          </a:fillRef>
-          <a:effectRef idx="0">
-            <a:schemeClr val="accent1"/>
-          </a:effectRef>
-          <a:fontRef idx="minor">
-            <a:schemeClr val="tx1"/>
-          </a:fontRef>
-        </p:style>
-      </p:cxnSp>
-      <p:cxnSp>
-        <p:nvCxnSpPr>
-          <p:cNvPr id="72" name="Connector: Elbow 71">
-            <a:extLst>
-              <a:ext uri="{FF2B5EF4-FFF2-40B4-BE49-F238E27FC236}">
-                <a16:creationId xmlns:a16="http://schemas.microsoft.com/office/drawing/2014/main" id="{E584E871-78B4-43F4-89E1-9F705AB25AEC}"/>
-              </a:ext>
-            </a:extLst>
-          </p:cNvPr>
-          <p:cNvCxnSpPr>
-            <a:cxnSpLocks/>
-            <a:stCxn id="11" idx="0"/>
-            <a:endCxn id="18" idx="2"/>
-          </p:cNvCxnSpPr>
-          <p:nvPr/>
-        </p:nvCxnSpPr>
-        <p:spPr>
-          <a:xfrm rot="16200000" flipV="1">
-            <a:off x="1526654" y="2285562"/>
-            <a:ext cx="530990" cy="2763"/>
+            <a:off x="4365485" y="1553910"/>
+            <a:ext cx="639741" cy="1932100"/>
           </a:xfrm>
           <a:prstGeom prst="bentConnector3">
             <a:avLst>
@@ -5002,24 +4897,24 @@
       </p:cxnSp>
       <p:cxnSp>
         <p:nvCxnSpPr>
-          <p:cNvPr id="75" name="Connector: Elbow 74">
-            <a:extLst>
-              <a:ext uri="{FF2B5EF4-FFF2-40B4-BE49-F238E27FC236}">
-                <a16:creationId xmlns:a16="http://schemas.microsoft.com/office/drawing/2014/main" id="{5102CC9A-6D74-423D-BB6C-897415534CAA}"/>
+          <p:cNvPr id="80" name="Connector: Elbow 79">
+            <a:extLst>
+              <a:ext uri="{FF2B5EF4-FFF2-40B4-BE49-F238E27FC236}">
+                <a16:creationId xmlns:a16="http://schemas.microsoft.com/office/drawing/2014/main" id="{96911CFA-174B-40CF-AD72-92B66F17E435}"/>
               </a:ext>
             </a:extLst>
           </p:cNvPr>
           <p:cNvCxnSpPr>
             <a:cxnSpLocks/>
-            <a:stCxn id="12" idx="0"/>
-            <a:endCxn id="19" idx="2"/>
+            <a:stCxn id="7" idx="0"/>
+            <a:endCxn id="17" idx="2"/>
           </p:cNvCxnSpPr>
           <p:nvPr/>
         </p:nvCxnSpPr>
         <p:spPr>
           <a:xfrm rot="5400000" flipH="1" flipV="1">
-            <a:off x="4428377" y="1319501"/>
-            <a:ext cx="530990" cy="1934887"/>
+            <a:off x="5679540" y="2171955"/>
+            <a:ext cx="1885741" cy="1942011"/>
           </a:xfrm>
           <a:prstGeom prst="bentConnector3">
             <a:avLst>
@@ -5049,30 +4944,111 @@
           </a:fontRef>
         </p:style>
       </p:cxnSp>
+      <p:pic>
+        <p:nvPicPr>
+          <p:cNvPr id="91" name="Picture 90" descr="Logo, company name&#10;&#10;Description automatically generated">
+            <a:extLst>
+              <a:ext uri="{FF2B5EF4-FFF2-40B4-BE49-F238E27FC236}">
+                <a16:creationId xmlns:a16="http://schemas.microsoft.com/office/drawing/2014/main" id="{5B6D21EA-410E-467F-B56E-82851B4E7780}"/>
+              </a:ext>
+            </a:extLst>
+          </p:cNvPr>
+          <p:cNvPicPr>
+            <a:picLocks noChangeAspect="1"/>
+          </p:cNvPicPr>
+          <p:nvPr/>
+        </p:nvPicPr>
+        <p:blipFill>
+          <a:blip r:embed="rId2">
+            <a:extLst>
+              <a:ext uri="{28A0092B-C50C-407E-A947-70E740481C1C}">
+                <a14:useLocalDpi xmlns:a14="http://schemas.microsoft.com/office/drawing/2010/main" val="0"/>
+              </a:ext>
+            </a:extLst>
+          </a:blip>
+          <a:stretch>
+            <a:fillRect/>
+          </a:stretch>
+        </p:blipFill>
+        <p:spPr>
+          <a:xfrm>
+            <a:off x="7120678" y="3467531"/>
+            <a:ext cx="5458483" cy="2033923"/>
+          </a:xfrm>
+          <a:prstGeom prst="rect">
+            <a:avLst/>
+          </a:prstGeom>
+        </p:spPr>
+      </p:pic>
       <p:cxnSp>
         <p:nvCxnSpPr>
-          <p:cNvPr id="80" name="Connector: Elbow 79">
-            <a:extLst>
-              <a:ext uri="{FF2B5EF4-FFF2-40B4-BE49-F238E27FC236}">
-                <a16:creationId xmlns:a16="http://schemas.microsoft.com/office/drawing/2014/main" id="{96911CFA-174B-40CF-AD72-92B66F17E435}"/>
+          <p:cNvPr id="92" name="Connector: Elbow 91">
+            <a:extLst>
+              <a:ext uri="{FF2B5EF4-FFF2-40B4-BE49-F238E27FC236}">
+                <a16:creationId xmlns:a16="http://schemas.microsoft.com/office/drawing/2014/main" id="{4B48DA87-1079-4A68-910E-F36093FFDE1B}"/>
               </a:ext>
             </a:extLst>
           </p:cNvPr>
           <p:cNvCxnSpPr>
             <a:cxnSpLocks/>
-            <a:stCxn id="7" idx="0"/>
-            <a:endCxn id="17" idx="2"/>
           </p:cNvCxnSpPr>
           <p:nvPr/>
         </p:nvCxnSpPr>
         <p:spPr>
-          <a:xfrm rot="5400000" flipH="1" flipV="1">
-            <a:off x="5733915" y="1938939"/>
-            <a:ext cx="1776990" cy="1942011"/>
+          <a:xfrm flipV="1">
+            <a:off x="11851101" y="5620679"/>
+            <a:ext cx="819701" cy="1"/>
           </a:xfrm>
           <a:prstGeom prst="bentConnector3">
             <a:avLst>
-              <a:gd name="adj1" fmla="val 51072"/>
+              <a:gd name="adj1" fmla="val 50000"/>
+            </a:avLst>
+          </a:prstGeom>
+          <a:ln w="28575">
+            <a:solidFill>
+              <a:schemeClr val="tx1"/>
+            </a:solidFill>
+            <a:prstDash val="sysDash"/>
+            <a:tailEnd type="triangle"/>
+          </a:ln>
+        </p:spPr>
+        <p:style>
+          <a:lnRef idx="1">
+            <a:schemeClr val="accent1"/>
+          </a:lnRef>
+          <a:fillRef idx="0">
+            <a:schemeClr val="accent1"/>
+          </a:fillRef>
+          <a:effectRef idx="0">
+            <a:schemeClr val="accent1"/>
+          </a:effectRef>
+          <a:fontRef idx="minor">
+            <a:schemeClr val="tx1"/>
+          </a:fontRef>
+        </p:style>
+      </p:cxnSp>
+      <p:cxnSp>
+        <p:nvCxnSpPr>
+          <p:cNvPr id="95" name="Connector: Elbow 94">
+            <a:extLst>
+              <a:ext uri="{FF2B5EF4-FFF2-40B4-BE49-F238E27FC236}">
+                <a16:creationId xmlns:a16="http://schemas.microsoft.com/office/drawing/2014/main" id="{BD1D0CAE-9B8B-4823-8A77-7EBBDF7BE739}"/>
+              </a:ext>
+            </a:extLst>
+          </p:cNvPr>
+          <p:cNvCxnSpPr>
+            <a:cxnSpLocks/>
+          </p:cNvCxnSpPr>
+          <p:nvPr/>
+        </p:nvCxnSpPr>
+        <p:spPr>
+          <a:xfrm flipV="1">
+            <a:off x="11851101" y="6027872"/>
+            <a:ext cx="819701" cy="1"/>
+          </a:xfrm>
+          <a:prstGeom prst="bentConnector3">
+            <a:avLst>
+              <a:gd name="adj1" fmla="val 50000"/>
             </a:avLst>
           </a:prstGeom>
           <a:ln w="28575">
@@ -5098,229 +5074,377 @@
           </a:fontRef>
         </p:style>
       </p:cxnSp>
-      <p:pic>
-        <p:nvPicPr>
-          <p:cNvPr id="91" name="Picture 90" descr="Logo, company name&#10;&#10;Description automatically generated">
-            <a:extLst>
-              <a:ext uri="{FF2B5EF4-FFF2-40B4-BE49-F238E27FC236}">
-                <a16:creationId xmlns:a16="http://schemas.microsoft.com/office/drawing/2014/main" id="{5B6D21EA-410E-467F-B56E-82851B4E7780}"/>
-              </a:ext>
-            </a:extLst>
-          </p:cNvPr>
-          <p:cNvPicPr>
-            <a:picLocks noChangeAspect="1"/>
-          </p:cNvPicPr>
+      <p:sp>
+        <p:nvSpPr>
+          <p:cNvPr id="96" name="TextBox 95">
+            <a:extLst>
+              <a:ext uri="{FF2B5EF4-FFF2-40B4-BE49-F238E27FC236}">
+                <a16:creationId xmlns:a16="http://schemas.microsoft.com/office/drawing/2014/main" id="{046A4082-BC83-4D22-B036-BBF564EBA39A}"/>
+              </a:ext>
+            </a:extLst>
+          </p:cNvPr>
+          <p:cNvSpPr txBox="1"/>
           <p:nvPr/>
-        </p:nvPicPr>
-        <p:blipFill>
-          <a:blip r:embed="rId2">
-            <a:extLst>
-              <a:ext uri="{28A0092B-C50C-407E-A947-70E740481C1C}">
-                <a14:useLocalDpi xmlns:a14="http://schemas.microsoft.com/office/drawing/2010/main" val="0"/>
-              </a:ext>
-            </a:extLst>
-          </a:blip>
-          <a:stretch>
-            <a:fillRect/>
-          </a:stretch>
-        </p:blipFill>
+        </p:nvSpPr>
         <p:spPr>
           <a:xfrm>
-            <a:off x="7044199" y="3142158"/>
-            <a:ext cx="5458483" cy="2033923"/>
+            <a:off x="11921274" y="5312318"/>
+            <a:ext cx="679353" cy="369332"/>
           </a:xfrm>
           <a:prstGeom prst="rect">
             <a:avLst/>
           </a:prstGeom>
-        </p:spPr>
-      </p:pic>
-      <p:grpSp>
-        <p:nvGrpSpPr>
-          <p:cNvPr id="99" name="Group 98">
-            <a:extLst>
-              <a:ext uri="{FF2B5EF4-FFF2-40B4-BE49-F238E27FC236}">
-                <a16:creationId xmlns:a16="http://schemas.microsoft.com/office/drawing/2014/main" id="{78CEE5B1-B25B-43D6-B163-3EAE764D32D1}"/>
-              </a:ext>
-            </a:extLst>
-          </p:cNvPr>
-          <p:cNvGrpSpPr/>
+          <a:noFill/>
+        </p:spPr>
+        <p:txBody>
+          <a:bodyPr wrap="none" rtlCol="0">
+            <a:spAutoFit/>
+          </a:bodyPr>
+          <a:lstStyle/>
+          <a:p>
+            <a:r>
+              <a:rPr lang="en-US" dirty="0"/>
+              <a:t>Refer</a:t>
+            </a:r>
+            <a:endParaRPr lang="LID4096" dirty="0"/>
+          </a:p>
+        </p:txBody>
+      </p:sp>
+      <p:sp>
+        <p:nvSpPr>
+          <p:cNvPr id="98" name="TextBox 97">
+            <a:extLst>
+              <a:ext uri="{FF2B5EF4-FFF2-40B4-BE49-F238E27FC236}">
+                <a16:creationId xmlns:a16="http://schemas.microsoft.com/office/drawing/2014/main" id="{9C007C8D-B56F-44FA-AA2B-FC1546346231}"/>
+              </a:ext>
+            </a:extLst>
+          </p:cNvPr>
+          <p:cNvSpPr txBox="1"/>
           <p:nvPr/>
-        </p:nvGrpSpPr>
-        <p:grpSpPr>
+        </p:nvSpPr>
+        <p:spPr>
           <a:xfrm>
-            <a:off x="11851101" y="5024927"/>
-            <a:ext cx="819701" cy="760384"/>
-            <a:chOff x="10596011" y="2258821"/>
-            <a:chExt cx="819701" cy="760384"/>
-          </a:xfrm>
-        </p:grpSpPr>
-        <p:cxnSp>
-          <p:nvCxnSpPr>
-            <p:cNvPr id="92" name="Connector: Elbow 91">
-              <a:extLst>
-                <a:ext uri="{FF2B5EF4-FFF2-40B4-BE49-F238E27FC236}">
-                  <a16:creationId xmlns:a16="http://schemas.microsoft.com/office/drawing/2014/main" id="{4B48DA87-1079-4A68-910E-F36093FFDE1B}"/>
-                </a:ext>
-              </a:extLst>
-            </p:cNvPr>
-            <p:cNvCxnSpPr>
-              <a:cxnSpLocks/>
-            </p:cNvCxnSpPr>
-            <p:nvPr/>
-          </p:nvCxnSpPr>
-          <p:spPr>
-            <a:xfrm flipV="1">
-              <a:off x="10596011" y="2567182"/>
-              <a:ext cx="819701" cy="1"/>
-            </a:xfrm>
-            <a:prstGeom prst="bentConnector3">
-              <a:avLst>
-                <a:gd name="adj1" fmla="val 50000"/>
-              </a:avLst>
-            </a:prstGeom>
-            <a:ln w="28575">
-              <a:solidFill>
-                <a:schemeClr val="tx1"/>
-              </a:solidFill>
-              <a:prstDash val="sysDash"/>
-              <a:tailEnd type="triangle"/>
-            </a:ln>
-          </p:spPr>
-          <p:style>
-            <a:lnRef idx="1">
-              <a:schemeClr val="accent1"/>
-            </a:lnRef>
-            <a:fillRef idx="0">
-              <a:schemeClr val="accent1"/>
-            </a:fillRef>
-            <a:effectRef idx="0">
-              <a:schemeClr val="accent1"/>
-            </a:effectRef>
-            <a:fontRef idx="minor">
+            <a:off x="11886905" y="5703370"/>
+            <a:ext cx="748090" cy="369332"/>
+          </a:xfrm>
+          <a:prstGeom prst="rect">
+            <a:avLst/>
+          </a:prstGeom>
+          <a:noFill/>
+        </p:spPr>
+        <p:txBody>
+          <a:bodyPr wrap="none" rtlCol="0">
+            <a:spAutoFit/>
+          </a:bodyPr>
+          <a:lstStyle/>
+          <a:p>
+            <a:r>
+              <a:rPr lang="en-US" dirty="0"/>
+              <a:t>Reuse</a:t>
+            </a:r>
+            <a:endParaRPr lang="LID4096" dirty="0"/>
+          </a:p>
+        </p:txBody>
+      </p:sp>
+      <p:cxnSp>
+        <p:nvCxnSpPr>
+          <p:cNvPr id="62" name="Connector: Elbow 61">
+            <a:extLst>
+              <a:ext uri="{FF2B5EF4-FFF2-40B4-BE49-F238E27FC236}">
+                <a16:creationId xmlns:a16="http://schemas.microsoft.com/office/drawing/2014/main" id="{C7FE759F-B063-4E67-BFEF-E3E0487351C7}"/>
+              </a:ext>
+            </a:extLst>
+          </p:cNvPr>
+          <p:cNvCxnSpPr>
+            <a:cxnSpLocks/>
+          </p:cNvCxnSpPr>
+          <p:nvPr/>
+        </p:nvCxnSpPr>
+        <p:spPr>
+          <a:xfrm rot="5400000" flipH="1" flipV="1">
+            <a:off x="1475202" y="2524779"/>
+            <a:ext cx="649382" cy="1"/>
+          </a:xfrm>
+          <a:prstGeom prst="bentConnector3">
+            <a:avLst>
+              <a:gd name="adj1" fmla="val 50000"/>
+            </a:avLst>
+          </a:prstGeom>
+          <a:ln w="28575">
+            <a:solidFill>
               <a:schemeClr val="tx1"/>
-            </a:fontRef>
-          </p:style>
-        </p:cxnSp>
-        <p:cxnSp>
-          <p:nvCxnSpPr>
-            <p:cNvPr id="95" name="Connector: Elbow 94">
-              <a:extLst>
-                <a:ext uri="{FF2B5EF4-FFF2-40B4-BE49-F238E27FC236}">
-                  <a16:creationId xmlns:a16="http://schemas.microsoft.com/office/drawing/2014/main" id="{BD1D0CAE-9B8B-4823-8A77-7EBBDF7BE739}"/>
-                </a:ext>
-              </a:extLst>
-            </p:cNvPr>
-            <p:cNvCxnSpPr>
-              <a:cxnSpLocks/>
-            </p:cNvCxnSpPr>
-            <p:nvPr/>
-          </p:nvCxnSpPr>
-          <p:spPr>
-            <a:xfrm flipV="1">
-              <a:off x="10596011" y="2974375"/>
-              <a:ext cx="819701" cy="1"/>
-            </a:xfrm>
-            <a:prstGeom prst="bentConnector3">
-              <a:avLst>
-                <a:gd name="adj1" fmla="val 50000"/>
-              </a:avLst>
-            </a:prstGeom>
-            <a:ln w="28575">
-              <a:solidFill>
-                <a:schemeClr val="tx1"/>
-              </a:solidFill>
-              <a:prstDash val="solid"/>
-              <a:tailEnd type="triangle"/>
-            </a:ln>
-          </p:spPr>
-          <p:style>
-            <a:lnRef idx="1">
-              <a:schemeClr val="accent1"/>
-            </a:lnRef>
-            <a:fillRef idx="0">
-              <a:schemeClr val="accent1"/>
-            </a:fillRef>
-            <a:effectRef idx="0">
-              <a:schemeClr val="accent1"/>
-            </a:effectRef>
-            <a:fontRef idx="minor">
+            </a:solidFill>
+            <a:prstDash val="solid"/>
+            <a:tailEnd type="triangle"/>
+          </a:ln>
+        </p:spPr>
+        <p:style>
+          <a:lnRef idx="1">
+            <a:schemeClr val="accent1"/>
+          </a:lnRef>
+          <a:fillRef idx="0">
+            <a:schemeClr val="accent1"/>
+          </a:fillRef>
+          <a:effectRef idx="0">
+            <a:schemeClr val="accent1"/>
+          </a:effectRef>
+          <a:fontRef idx="minor">
+            <a:schemeClr val="tx1"/>
+          </a:fontRef>
+        </p:style>
+      </p:cxnSp>
+      <p:cxnSp>
+        <p:nvCxnSpPr>
+          <p:cNvPr id="104" name="Connector: Elbow 103">
+            <a:extLst>
+              <a:ext uri="{FF2B5EF4-FFF2-40B4-BE49-F238E27FC236}">
+                <a16:creationId xmlns:a16="http://schemas.microsoft.com/office/drawing/2014/main" id="{0E261430-1AB2-4824-A6CB-167ECC09F199}"/>
+              </a:ext>
+            </a:extLst>
+          </p:cNvPr>
+          <p:cNvCxnSpPr>
+            <a:cxnSpLocks/>
+            <a:stCxn id="74" idx="0"/>
+            <a:endCxn id="100" idx="0"/>
+          </p:cNvCxnSpPr>
+          <p:nvPr/>
+        </p:nvCxnSpPr>
+        <p:spPr>
+          <a:xfrm rot="16200000" flipH="1">
+            <a:off x="7961919" y="-2548209"/>
+            <a:ext cx="7487" cy="7703178"/>
+          </a:xfrm>
+          <a:prstGeom prst="bentConnector3">
+            <a:avLst>
+              <a:gd name="adj1" fmla="val -6920956"/>
+            </a:avLst>
+          </a:prstGeom>
+          <a:ln w="28575">
+            <a:solidFill>
               <a:schemeClr val="tx1"/>
-            </a:fontRef>
-          </p:style>
-        </p:cxnSp>
-        <p:sp>
-          <p:nvSpPr>
-            <p:cNvPr id="96" name="TextBox 95">
-              <a:extLst>
-                <a:ext uri="{FF2B5EF4-FFF2-40B4-BE49-F238E27FC236}">
-                  <a16:creationId xmlns:a16="http://schemas.microsoft.com/office/drawing/2014/main" id="{046A4082-BC83-4D22-B036-BBF564EBA39A}"/>
-                </a:ext>
-              </a:extLst>
-            </p:cNvPr>
-            <p:cNvSpPr txBox="1"/>
-            <p:nvPr/>
-          </p:nvSpPr>
-          <p:spPr>
-            <a:xfrm>
-              <a:off x="10666184" y="2258821"/>
-              <a:ext cx="679353" cy="369332"/>
-            </a:xfrm>
-            <a:prstGeom prst="rect">
-              <a:avLst/>
-            </a:prstGeom>
+            </a:solidFill>
+            <a:prstDash val="sysDash"/>
+            <a:tailEnd type="triangle"/>
+          </a:ln>
+        </p:spPr>
+        <p:style>
+          <a:lnRef idx="1">
+            <a:schemeClr val="accent1"/>
+          </a:lnRef>
+          <a:fillRef idx="0">
+            <a:schemeClr val="accent1"/>
+          </a:fillRef>
+          <a:effectRef idx="0">
+            <a:schemeClr val="accent1"/>
+          </a:effectRef>
+          <a:fontRef idx="minor">
+            <a:schemeClr val="tx1"/>
+          </a:fontRef>
+        </p:style>
+      </p:cxnSp>
+      <p:cxnSp>
+        <p:nvCxnSpPr>
+          <p:cNvPr id="108" name="Connector: Elbow 107">
+            <a:extLst>
+              <a:ext uri="{FF2B5EF4-FFF2-40B4-BE49-F238E27FC236}">
+                <a16:creationId xmlns:a16="http://schemas.microsoft.com/office/drawing/2014/main" id="{93216B42-7276-4354-B86C-752D17F24244}"/>
+              </a:ext>
+            </a:extLst>
+          </p:cNvPr>
+          <p:cNvCxnSpPr>
+            <a:cxnSpLocks/>
+            <a:stCxn id="19" idx="0"/>
+            <a:endCxn id="16" idx="0"/>
+          </p:cNvCxnSpPr>
+          <p:nvPr/>
+        </p:nvCxnSpPr>
+        <p:spPr>
+          <a:xfrm rot="5400000" flipH="1" flipV="1">
+            <a:off x="7585286" y="-633792"/>
+            <a:ext cx="12700" cy="3867762"/>
+          </a:xfrm>
+          <a:prstGeom prst="bentConnector3">
+            <a:avLst>
+              <a:gd name="adj1" fmla="val 2992504"/>
+            </a:avLst>
+          </a:prstGeom>
+          <a:ln w="28575">
+            <a:solidFill>
+              <a:schemeClr val="tx1"/>
+            </a:solidFill>
+            <a:prstDash val="sysDash"/>
+            <a:tailEnd type="triangle"/>
+          </a:ln>
+        </p:spPr>
+        <p:style>
+          <a:lnRef idx="1">
+            <a:schemeClr val="accent1"/>
+          </a:lnRef>
+          <a:fillRef idx="0">
+            <a:schemeClr val="accent1"/>
+          </a:fillRef>
+          <a:effectRef idx="0">
+            <a:schemeClr val="accent1"/>
+          </a:effectRef>
+          <a:fontRef idx="minor">
+            <a:schemeClr val="tx1"/>
+          </a:fontRef>
+        </p:style>
+      </p:cxnSp>
+      <p:cxnSp>
+        <p:nvCxnSpPr>
+          <p:cNvPr id="116" name="Connector: Elbow 115">
+            <a:extLst>
+              <a:ext uri="{FF2B5EF4-FFF2-40B4-BE49-F238E27FC236}">
+                <a16:creationId xmlns:a16="http://schemas.microsoft.com/office/drawing/2014/main" id="{C422379B-A3E1-4142-A572-3CE3417723EE}"/>
+              </a:ext>
+            </a:extLst>
+          </p:cNvPr>
+          <p:cNvCxnSpPr>
+            <a:cxnSpLocks/>
+            <a:stCxn id="17" idx="0"/>
+            <a:endCxn id="33" idx="0"/>
+          </p:cNvCxnSpPr>
+          <p:nvPr/>
+        </p:nvCxnSpPr>
+        <p:spPr>
+          <a:xfrm rot="16200000" flipH="1">
+            <a:off x="8334067" y="559438"/>
+            <a:ext cx="10064" cy="1491367"/>
+          </a:xfrm>
+          <a:prstGeom prst="bentConnector3">
+            <a:avLst>
+              <a:gd name="adj1" fmla="val -2309420"/>
+            </a:avLst>
+          </a:prstGeom>
+          <a:ln w="28575">
+            <a:solidFill>
+              <a:schemeClr val="tx1"/>
+            </a:solidFill>
+            <a:prstDash val="sysDash"/>
+            <a:tailEnd type="triangle"/>
+          </a:ln>
+        </p:spPr>
+        <p:style>
+          <a:lnRef idx="1">
+            <a:schemeClr val="accent1"/>
+          </a:lnRef>
+          <a:fillRef idx="0">
+            <a:schemeClr val="accent1"/>
+          </a:fillRef>
+          <a:effectRef idx="0">
+            <a:schemeClr val="accent1"/>
+          </a:effectRef>
+          <a:fontRef idx="minor">
+            <a:schemeClr val="tx1"/>
+          </a:fontRef>
+        </p:style>
+      </p:cxnSp>
+      <p:cxnSp>
+        <p:nvCxnSpPr>
+          <p:cNvPr id="131" name="Connector: Elbow 130">
+            <a:extLst>
+              <a:ext uri="{FF2B5EF4-FFF2-40B4-BE49-F238E27FC236}">
+                <a16:creationId xmlns:a16="http://schemas.microsoft.com/office/drawing/2014/main" id="{0C927C73-7723-4CAE-A8E1-082C7F24C41F}"/>
+              </a:ext>
+            </a:extLst>
+          </p:cNvPr>
+          <p:cNvCxnSpPr>
+            <a:cxnSpLocks/>
+            <a:stCxn id="77" idx="0"/>
+            <a:endCxn id="84" idx="0"/>
+          </p:cNvCxnSpPr>
+          <p:nvPr/>
+        </p:nvCxnSpPr>
+        <p:spPr>
+          <a:xfrm rot="5400000" flipH="1" flipV="1">
+            <a:off x="10494082" y="767474"/>
+            <a:ext cx="12700" cy="1079300"/>
+          </a:xfrm>
+          <a:prstGeom prst="bentConnector3">
+            <a:avLst>
+              <a:gd name="adj1" fmla="val 1965000"/>
+            </a:avLst>
+          </a:prstGeom>
+          <a:ln w="28575">
+            <a:solidFill>
+              <a:schemeClr val="tx1"/>
+            </a:solidFill>
+            <a:prstDash val="sysDash"/>
+            <a:tailEnd type="triangle"/>
+          </a:ln>
+        </p:spPr>
+        <p:style>
+          <a:lnRef idx="1">
+            <a:schemeClr val="accent1"/>
+          </a:lnRef>
+          <a:fillRef idx="0">
+            <a:schemeClr val="accent1"/>
+          </a:fillRef>
+          <a:effectRef idx="0">
+            <a:schemeClr val="accent1"/>
+          </a:effectRef>
+          <a:fontRef idx="minor">
+            <a:schemeClr val="tx1"/>
+          </a:fontRef>
+        </p:style>
+      </p:cxnSp>
+      <p:sp>
+        <p:nvSpPr>
+          <p:cNvPr id="11" name="Rectangle 10">
+            <a:extLst>
+              <a:ext uri="{FF2B5EF4-FFF2-40B4-BE49-F238E27FC236}">
+                <a16:creationId xmlns:a16="http://schemas.microsoft.com/office/drawing/2014/main" id="{66D842DB-377E-4081-A0C1-1E0BF3AB17EF}"/>
+              </a:ext>
+            </a:extLst>
+          </p:cNvPr>
+          <p:cNvSpPr/>
+          <p:nvPr/>
+        </p:nvSpPr>
+        <p:spPr>
+          <a:xfrm>
+            <a:off x="904530" y="2838887"/>
+            <a:ext cx="1778000" cy="721360"/>
+          </a:xfrm>
+          <a:prstGeom prst="rect">
+            <a:avLst/>
+          </a:prstGeom>
+          <a:solidFill>
+            <a:srgbClr val="F5B335"/>
+          </a:solidFill>
+          <a:ln>
             <a:noFill/>
-          </p:spPr>
-          <p:txBody>
-            <a:bodyPr wrap="none" rtlCol="0">
-              <a:spAutoFit/>
-            </a:bodyPr>
-            <a:lstStyle/>
-            <a:p>
-              <a:r>
-                <a:rPr lang="en-US" dirty="0"/>
-                <a:t>Refer</a:t>
-              </a:r>
-              <a:endParaRPr lang="LID4096" dirty="0"/>
-            </a:p>
-          </p:txBody>
-        </p:sp>
-        <p:sp>
-          <p:nvSpPr>
-            <p:cNvPr id="98" name="TextBox 97">
-              <a:extLst>
-                <a:ext uri="{FF2B5EF4-FFF2-40B4-BE49-F238E27FC236}">
-                  <a16:creationId xmlns:a16="http://schemas.microsoft.com/office/drawing/2014/main" id="{9C007C8D-B56F-44FA-AA2B-FC1546346231}"/>
-                </a:ext>
-              </a:extLst>
-            </p:cNvPr>
-            <p:cNvSpPr txBox="1"/>
-            <p:nvPr/>
-          </p:nvSpPr>
-          <p:spPr>
-            <a:xfrm>
-              <a:off x="10631815" y="2649873"/>
-              <a:ext cx="748090" cy="369332"/>
-            </a:xfrm>
-            <a:prstGeom prst="rect">
-              <a:avLst/>
-            </a:prstGeom>
-            <a:noFill/>
-          </p:spPr>
-          <p:txBody>
-            <a:bodyPr wrap="none" rtlCol="0">
-              <a:spAutoFit/>
-            </a:bodyPr>
-            <a:lstStyle/>
-            <a:p>
-              <a:r>
-                <a:rPr lang="en-US" dirty="0"/>
-                <a:t>Reuse</a:t>
-              </a:r>
-              <a:endParaRPr lang="LID4096" dirty="0"/>
-            </a:p>
-          </p:txBody>
-        </p:sp>
-      </p:grpSp>
+          </a:ln>
+        </p:spPr>
+        <p:style>
+          <a:lnRef idx="2">
+            <a:schemeClr val="accent1">
+              <a:shade val="50000"/>
+            </a:schemeClr>
+          </a:lnRef>
+          <a:fillRef idx="1">
+            <a:schemeClr val="accent1"/>
+          </a:fillRef>
+          <a:effectRef idx="0">
+            <a:schemeClr val="accent1"/>
+          </a:effectRef>
+          <a:fontRef idx="minor">
+            <a:schemeClr val="lt1"/>
+          </a:fontRef>
+        </p:style>
+        <p:txBody>
+          <a:bodyPr rtlCol="0" anchor="ctr"/>
+          <a:lstStyle/>
+          <a:p>
+            <a:pPr algn="ctr"/>
+            <a:r>
+              <a:rPr lang="en-US" sz="1600" dirty="0"/>
+              <a:t>CIRV</a:t>
+            </a:r>
+            <a:endParaRPr lang="LID4096" sz="1600" dirty="0"/>
+          </a:p>
+        </p:txBody>
+      </p:sp>
     </p:spTree>
     <p:extLst>
       <p:ext uri="{BB962C8B-B14F-4D97-AF65-F5344CB8AC3E}">

</xml_diff>